<commit_message>
Completed Time Analysis Page
</commit_message>
<xml_diff>
--- a/Dashboard Background Design/Dashboard Background Design.pptx
+++ b/Dashboard Background Design/Dashboard Background Design.pptx
@@ -8,7 +8,7 @@
     <p:sldId id="256" r:id="rId2"/>
     <p:sldId id="259" r:id="rId3"/>
     <p:sldId id="260" r:id="rId4"/>
-    <p:sldId id="257" r:id="rId5"/>
+    <p:sldId id="261" r:id="rId5"/>
   </p:sldIdLst>
   <p:sldSz cx="15849600" cy="8915400"/>
   <p:notesSz cx="6858000" cy="9144000"/>
@@ -246,7 +246,7 @@
           <a:p>
             <a:fld id="{3DD42230-267C-431A-8169-41D027ABCFB4}" type="datetimeFigureOut">
               <a:rPr lang="en-US" smtClean="0"/>
-              <a:t>11/22/2025</a:t>
+              <a:t>11/23/2025</a:t>
             </a:fld>
             <a:endParaRPr lang="en-US"/>
           </a:p>
@@ -416,7 +416,7 @@
           <a:p>
             <a:fld id="{3DD42230-267C-431A-8169-41D027ABCFB4}" type="datetimeFigureOut">
               <a:rPr lang="en-US" smtClean="0"/>
-              <a:t>11/22/2025</a:t>
+              <a:t>11/23/2025</a:t>
             </a:fld>
             <a:endParaRPr lang="en-US"/>
           </a:p>
@@ -596,7 +596,7 @@
           <a:p>
             <a:fld id="{3DD42230-267C-431A-8169-41D027ABCFB4}" type="datetimeFigureOut">
               <a:rPr lang="en-US" smtClean="0"/>
-              <a:t>11/22/2025</a:t>
+              <a:t>11/23/2025</a:t>
             </a:fld>
             <a:endParaRPr lang="en-US"/>
           </a:p>
@@ -766,7 +766,7 @@
           <a:p>
             <a:fld id="{3DD42230-267C-431A-8169-41D027ABCFB4}" type="datetimeFigureOut">
               <a:rPr lang="en-US" smtClean="0"/>
-              <a:t>11/22/2025</a:t>
+              <a:t>11/23/2025</a:t>
             </a:fld>
             <a:endParaRPr lang="en-US"/>
           </a:p>
@@ -1012,7 +1012,7 @@
           <a:p>
             <a:fld id="{3DD42230-267C-431A-8169-41D027ABCFB4}" type="datetimeFigureOut">
               <a:rPr lang="en-US" smtClean="0"/>
-              <a:t>11/22/2025</a:t>
+              <a:t>11/23/2025</a:t>
             </a:fld>
             <a:endParaRPr lang="en-US"/>
           </a:p>
@@ -1244,7 +1244,7 @@
           <a:p>
             <a:fld id="{3DD42230-267C-431A-8169-41D027ABCFB4}" type="datetimeFigureOut">
               <a:rPr lang="en-US" smtClean="0"/>
-              <a:t>11/22/2025</a:t>
+              <a:t>11/23/2025</a:t>
             </a:fld>
             <a:endParaRPr lang="en-US"/>
           </a:p>
@@ -1611,7 +1611,7 @@
           <a:p>
             <a:fld id="{3DD42230-267C-431A-8169-41D027ABCFB4}" type="datetimeFigureOut">
               <a:rPr lang="en-US" smtClean="0"/>
-              <a:t>11/22/2025</a:t>
+              <a:t>11/23/2025</a:t>
             </a:fld>
             <a:endParaRPr lang="en-US"/>
           </a:p>
@@ -1729,7 +1729,7 @@
           <a:p>
             <a:fld id="{3DD42230-267C-431A-8169-41D027ABCFB4}" type="datetimeFigureOut">
               <a:rPr lang="en-US" smtClean="0"/>
-              <a:t>11/22/2025</a:t>
+              <a:t>11/23/2025</a:t>
             </a:fld>
             <a:endParaRPr lang="en-US"/>
           </a:p>
@@ -1824,7 +1824,7 @@
           <a:p>
             <a:fld id="{3DD42230-267C-431A-8169-41D027ABCFB4}" type="datetimeFigureOut">
               <a:rPr lang="en-US" smtClean="0"/>
-              <a:t>11/22/2025</a:t>
+              <a:t>11/23/2025</a:t>
             </a:fld>
             <a:endParaRPr lang="en-US"/>
           </a:p>
@@ -2101,7 +2101,7 @@
           <a:p>
             <a:fld id="{3DD42230-267C-431A-8169-41D027ABCFB4}" type="datetimeFigureOut">
               <a:rPr lang="en-US" smtClean="0"/>
-              <a:t>11/22/2025</a:t>
+              <a:t>11/23/2025</a:t>
             </a:fld>
             <a:endParaRPr lang="en-US"/>
           </a:p>
@@ -2358,7 +2358,7 @@
           <a:p>
             <a:fld id="{3DD42230-267C-431A-8169-41D027ABCFB4}" type="datetimeFigureOut">
               <a:rPr lang="en-US" smtClean="0"/>
-              <a:t>11/22/2025</a:t>
+              <a:t>11/23/2025</a:t>
             </a:fld>
             <a:endParaRPr lang="en-US"/>
           </a:p>
@@ -2571,7 +2571,7 @@
           <a:p>
             <a:fld id="{3DD42230-267C-431A-8169-41D027ABCFB4}" type="datetimeFigureOut">
               <a:rPr lang="en-US" smtClean="0"/>
-              <a:t>11/22/2025</a:t>
+              <a:t>11/23/2025</a:t>
             </a:fld>
             <a:endParaRPr lang="en-US"/>
           </a:p>
@@ -3983,8 +3983,8 @@
         </p:nvSpPr>
         <p:spPr>
           <a:xfrm>
-            <a:off x="1203693" y="5753074"/>
-            <a:ext cx="14441539" cy="3004283"/>
+            <a:off x="1203693" y="5943600"/>
+            <a:ext cx="14441539" cy="2813757"/>
           </a:xfrm>
           <a:prstGeom prst="roundRect">
             <a:avLst>
@@ -4039,8 +4039,8 @@
         </p:nvSpPr>
         <p:spPr>
           <a:xfrm>
-            <a:off x="1224037" y="2496707"/>
-            <a:ext cx="14421195" cy="3083478"/>
+            <a:off x="1224037" y="2798638"/>
+            <a:ext cx="14421195" cy="3004283"/>
           </a:xfrm>
           <a:prstGeom prst="roundRect">
             <a:avLst>
@@ -4297,7 +4297,7 @@
         <p:spPr>
           <a:xfrm>
             <a:off x="1250363" y="952218"/>
-            <a:ext cx="2715314" cy="1371600"/>
+            <a:ext cx="2715314" cy="1645920"/>
           </a:xfrm>
           <a:prstGeom prst="roundRect">
             <a:avLst>
@@ -4353,7 +4353,7 @@
         <p:spPr>
           <a:xfrm>
             <a:off x="12968045" y="952218"/>
-            <a:ext cx="2715314" cy="1371600"/>
+            <a:ext cx="2715314" cy="1645920"/>
           </a:xfrm>
           <a:prstGeom prst="roundRect">
             <a:avLst>
@@ -4409,7 +4409,7 @@
         <p:spPr>
           <a:xfrm>
             <a:off x="4179784" y="952218"/>
-            <a:ext cx="2715314" cy="1371600"/>
+            <a:ext cx="2715314" cy="1645920"/>
           </a:xfrm>
           <a:prstGeom prst="roundRect">
             <a:avLst>
@@ -4465,7 +4465,7 @@
         <p:spPr>
           <a:xfrm>
             <a:off x="7109205" y="952218"/>
-            <a:ext cx="2715314" cy="1371600"/>
+            <a:ext cx="2715314" cy="1645920"/>
           </a:xfrm>
           <a:prstGeom prst="roundRect">
             <a:avLst>
@@ -4521,7 +4521,7 @@
         <p:spPr>
           <a:xfrm>
             <a:off x="10038626" y="952218"/>
-            <a:ext cx="2715314" cy="1371600"/>
+            <a:ext cx="2715314" cy="1645920"/>
           </a:xfrm>
           <a:prstGeom prst="roundRect">
             <a:avLst>
@@ -4613,7 +4613,7 @@
         </p:nvCxnSpPr>
         <p:spPr>
           <a:xfrm>
-            <a:off x="8434634" y="2751776"/>
+            <a:off x="8434634" y="3014109"/>
             <a:ext cx="0" cy="2573340"/>
           </a:xfrm>
           <a:prstGeom prst="line">
@@ -4658,7 +4658,7 @@
         </p:nvCxnSpPr>
         <p:spPr>
           <a:xfrm>
-            <a:off x="8424462" y="5945579"/>
+            <a:off x="8424462" y="6040842"/>
             <a:ext cx="0" cy="2619273"/>
           </a:xfrm>
           <a:prstGeom prst="line">
@@ -4737,8 +4737,8 @@
         </p:nvSpPr>
         <p:spPr>
           <a:xfrm>
-            <a:off x="1203693" y="5935180"/>
-            <a:ext cx="14441539" cy="2822177"/>
+            <a:off x="1203693" y="5434298"/>
+            <a:ext cx="14441539" cy="3323060"/>
           </a:xfrm>
           <a:prstGeom prst="roundRect">
             <a:avLst>
@@ -4793,8 +4793,8 @@
         </p:nvSpPr>
         <p:spPr>
           <a:xfrm>
-            <a:off x="1224037" y="2980220"/>
-            <a:ext cx="14421195" cy="2778849"/>
+            <a:off x="1224037" y="1769237"/>
+            <a:ext cx="14421195" cy="3480752"/>
           </a:xfrm>
           <a:prstGeom prst="roundRect">
             <a:avLst>
@@ -5001,8 +5001,8 @@
         </p:nvSpPr>
         <p:spPr>
           <a:xfrm>
-            <a:off x="1203693" y="179965"/>
-            <a:ext cx="3083170" cy="584775"/>
+            <a:off x="1203692" y="179965"/>
+            <a:ext cx="5419845" cy="584775"/>
           </a:xfrm>
           <a:prstGeom prst="rect">
             <a:avLst/>
@@ -5019,298 +5019,14 @@
           <a:lstStyle/>
           <a:p>
             <a:r>
-              <a:rPr lang="en-US" sz="3200" dirty="0">
-                <a:latin typeface="Open Sans" pitchFamily="2" charset="0"/>
-                <a:ea typeface="Open Sans" pitchFamily="2" charset="0"/>
-                <a:cs typeface="Open Sans" pitchFamily="2" charset="0"/>
-              </a:rPr>
-              <a:t>Overview</a:t>
+              <a:rPr lang="en-US" sz="3200" dirty="0"/>
+              <a:t>Time &amp; Seasonality Analysis</a:t>
             </a:r>
             <a:endParaRPr lang="en-US" dirty="0">
               <a:latin typeface="Open Sans" pitchFamily="2" charset="0"/>
               <a:ea typeface="Open Sans" pitchFamily="2" charset="0"/>
               <a:cs typeface="Open Sans" pitchFamily="2" charset="0"/>
             </a:endParaRPr>
-          </a:p>
-        </p:txBody>
-      </p:sp>
-      <p:sp>
-        <p:nvSpPr>
-          <p:cNvPr id="14" name="Rectangle: Rounded Corners 13">
-            <a:extLst>
-              <a:ext uri="{FF2B5EF4-FFF2-40B4-BE49-F238E27FC236}">
-                <a16:creationId xmlns:a16="http://schemas.microsoft.com/office/drawing/2014/main" id="{9A25FC53-CCC6-4DC1-BD02-D251BF0785D6}"/>
-              </a:ext>
-            </a:extLst>
-          </p:cNvPr>
-          <p:cNvSpPr/>
-          <p:nvPr/>
-        </p:nvSpPr>
-        <p:spPr>
-          <a:xfrm>
-            <a:off x="1250363" y="952218"/>
-            <a:ext cx="2715314" cy="1828800"/>
-          </a:xfrm>
-          <a:prstGeom prst="roundRect">
-            <a:avLst>
-              <a:gd name="adj" fmla="val 5556"/>
-            </a:avLst>
-          </a:prstGeom>
-          <a:ln>
-            <a:noFill/>
-          </a:ln>
-          <a:effectLst>
-            <a:outerShdw blurRad="50800" dist="38100" dir="2700000" algn="tl" rotWithShape="0">
-              <a:prstClr val="black">
-                <a:alpha val="40000"/>
-              </a:prstClr>
-            </a:outerShdw>
-          </a:effectLst>
-        </p:spPr>
-        <p:style>
-          <a:lnRef idx="2">
-            <a:schemeClr val="accent6"/>
-          </a:lnRef>
-          <a:fillRef idx="1">
-            <a:schemeClr val="lt1"/>
-          </a:fillRef>
-          <a:effectRef idx="0">
-            <a:schemeClr val="accent6"/>
-          </a:effectRef>
-          <a:fontRef idx="minor">
-            <a:schemeClr val="dk1"/>
-          </a:fontRef>
-        </p:style>
-        <p:txBody>
-          <a:bodyPr rtlCol="0" anchor="ctr"/>
-          <a:lstStyle/>
-          <a:p>
-            <a:pPr algn="ctr"/>
-            <a:endParaRPr lang="en-US"/>
-          </a:p>
-        </p:txBody>
-      </p:sp>
-      <p:sp>
-        <p:nvSpPr>
-          <p:cNvPr id="23" name="Rectangle: Rounded Corners 22">
-            <a:extLst>
-              <a:ext uri="{FF2B5EF4-FFF2-40B4-BE49-F238E27FC236}">
-                <a16:creationId xmlns:a16="http://schemas.microsoft.com/office/drawing/2014/main" id="{79349347-8B06-EA1B-C9E4-FDE1A69AC14C}"/>
-              </a:ext>
-            </a:extLst>
-          </p:cNvPr>
-          <p:cNvSpPr/>
-          <p:nvPr/>
-        </p:nvSpPr>
-        <p:spPr>
-          <a:xfrm>
-            <a:off x="12968045" y="952218"/>
-            <a:ext cx="2715314" cy="1828800"/>
-          </a:xfrm>
-          <a:prstGeom prst="roundRect">
-            <a:avLst>
-              <a:gd name="adj" fmla="val 5556"/>
-            </a:avLst>
-          </a:prstGeom>
-          <a:ln>
-            <a:noFill/>
-          </a:ln>
-          <a:effectLst>
-            <a:outerShdw blurRad="50800" dist="38100" dir="2700000" algn="tl" rotWithShape="0">
-              <a:prstClr val="black">
-                <a:alpha val="40000"/>
-              </a:prstClr>
-            </a:outerShdw>
-          </a:effectLst>
-        </p:spPr>
-        <p:style>
-          <a:lnRef idx="2">
-            <a:schemeClr val="accent6"/>
-          </a:lnRef>
-          <a:fillRef idx="1">
-            <a:schemeClr val="lt1"/>
-          </a:fillRef>
-          <a:effectRef idx="0">
-            <a:schemeClr val="accent6"/>
-          </a:effectRef>
-          <a:fontRef idx="minor">
-            <a:schemeClr val="dk1"/>
-          </a:fontRef>
-        </p:style>
-        <p:txBody>
-          <a:bodyPr rtlCol="0" anchor="ctr"/>
-          <a:lstStyle/>
-          <a:p>
-            <a:pPr algn="ctr"/>
-            <a:endParaRPr lang="en-US"/>
-          </a:p>
-        </p:txBody>
-      </p:sp>
-      <p:sp>
-        <p:nvSpPr>
-          <p:cNvPr id="24" name="Rectangle: Rounded Corners 23">
-            <a:extLst>
-              <a:ext uri="{FF2B5EF4-FFF2-40B4-BE49-F238E27FC236}">
-                <a16:creationId xmlns:a16="http://schemas.microsoft.com/office/drawing/2014/main" id="{A069799D-1647-1974-6BFD-89B10F1008DC}"/>
-              </a:ext>
-            </a:extLst>
-          </p:cNvPr>
-          <p:cNvSpPr/>
-          <p:nvPr/>
-        </p:nvSpPr>
-        <p:spPr>
-          <a:xfrm>
-            <a:off x="4179784" y="952218"/>
-            <a:ext cx="2715314" cy="1828800"/>
-          </a:xfrm>
-          <a:prstGeom prst="roundRect">
-            <a:avLst>
-              <a:gd name="adj" fmla="val 5556"/>
-            </a:avLst>
-          </a:prstGeom>
-          <a:ln>
-            <a:noFill/>
-          </a:ln>
-          <a:effectLst>
-            <a:outerShdw blurRad="50800" dist="38100" dir="2700000" algn="tl" rotWithShape="0">
-              <a:prstClr val="black">
-                <a:alpha val="40000"/>
-              </a:prstClr>
-            </a:outerShdw>
-          </a:effectLst>
-        </p:spPr>
-        <p:style>
-          <a:lnRef idx="2">
-            <a:schemeClr val="accent6"/>
-          </a:lnRef>
-          <a:fillRef idx="1">
-            <a:schemeClr val="lt1"/>
-          </a:fillRef>
-          <a:effectRef idx="0">
-            <a:schemeClr val="accent6"/>
-          </a:effectRef>
-          <a:fontRef idx="minor">
-            <a:schemeClr val="dk1"/>
-          </a:fontRef>
-        </p:style>
-        <p:txBody>
-          <a:bodyPr rtlCol="0" anchor="ctr"/>
-          <a:lstStyle/>
-          <a:p>
-            <a:pPr algn="ctr"/>
-            <a:endParaRPr lang="en-US"/>
-          </a:p>
-        </p:txBody>
-      </p:sp>
-      <p:sp>
-        <p:nvSpPr>
-          <p:cNvPr id="25" name="Rectangle: Rounded Corners 24">
-            <a:extLst>
-              <a:ext uri="{FF2B5EF4-FFF2-40B4-BE49-F238E27FC236}">
-                <a16:creationId xmlns:a16="http://schemas.microsoft.com/office/drawing/2014/main" id="{5B915CB8-D438-6858-1336-061867F4B70A}"/>
-              </a:ext>
-            </a:extLst>
-          </p:cNvPr>
-          <p:cNvSpPr/>
-          <p:nvPr/>
-        </p:nvSpPr>
-        <p:spPr>
-          <a:xfrm>
-            <a:off x="7109205" y="952218"/>
-            <a:ext cx="2715314" cy="1828800"/>
-          </a:xfrm>
-          <a:prstGeom prst="roundRect">
-            <a:avLst>
-              <a:gd name="adj" fmla="val 5556"/>
-            </a:avLst>
-          </a:prstGeom>
-          <a:ln>
-            <a:noFill/>
-          </a:ln>
-          <a:effectLst>
-            <a:outerShdw blurRad="50800" dist="38100" dir="2700000" algn="tl" rotWithShape="0">
-              <a:prstClr val="black">
-                <a:alpha val="40000"/>
-              </a:prstClr>
-            </a:outerShdw>
-          </a:effectLst>
-        </p:spPr>
-        <p:style>
-          <a:lnRef idx="2">
-            <a:schemeClr val="accent6"/>
-          </a:lnRef>
-          <a:fillRef idx="1">
-            <a:schemeClr val="lt1"/>
-          </a:fillRef>
-          <a:effectRef idx="0">
-            <a:schemeClr val="accent6"/>
-          </a:effectRef>
-          <a:fontRef idx="minor">
-            <a:schemeClr val="dk1"/>
-          </a:fontRef>
-        </p:style>
-        <p:txBody>
-          <a:bodyPr rtlCol="0" anchor="ctr"/>
-          <a:lstStyle/>
-          <a:p>
-            <a:pPr algn="ctr"/>
-            <a:endParaRPr lang="en-US"/>
-          </a:p>
-        </p:txBody>
-      </p:sp>
-      <p:sp>
-        <p:nvSpPr>
-          <p:cNvPr id="26" name="Rectangle: Rounded Corners 25">
-            <a:extLst>
-              <a:ext uri="{FF2B5EF4-FFF2-40B4-BE49-F238E27FC236}">
-                <a16:creationId xmlns:a16="http://schemas.microsoft.com/office/drawing/2014/main" id="{B748B323-2AB1-E4EF-00E2-D76166A74FCA}"/>
-              </a:ext>
-            </a:extLst>
-          </p:cNvPr>
-          <p:cNvSpPr/>
-          <p:nvPr/>
-        </p:nvSpPr>
-        <p:spPr>
-          <a:xfrm>
-            <a:off x="10038626" y="952218"/>
-            <a:ext cx="2715314" cy="1828800"/>
-          </a:xfrm>
-          <a:prstGeom prst="roundRect">
-            <a:avLst>
-              <a:gd name="adj" fmla="val 5556"/>
-            </a:avLst>
-          </a:prstGeom>
-          <a:ln>
-            <a:noFill/>
-          </a:ln>
-          <a:effectLst>
-            <a:outerShdw blurRad="50800" dist="38100" dir="2700000" algn="tl" rotWithShape="0">
-              <a:prstClr val="black">
-                <a:alpha val="40000"/>
-              </a:prstClr>
-            </a:outerShdw>
-          </a:effectLst>
-        </p:spPr>
-        <p:style>
-          <a:lnRef idx="2">
-            <a:schemeClr val="accent6"/>
-          </a:lnRef>
-          <a:fillRef idx="1">
-            <a:schemeClr val="lt1"/>
-          </a:fillRef>
-          <a:effectRef idx="0">
-            <a:schemeClr val="accent6"/>
-          </a:effectRef>
-          <a:fontRef idx="minor">
-            <a:schemeClr val="dk1"/>
-          </a:fontRef>
-        </p:style>
-        <p:txBody>
-          <a:bodyPr rtlCol="0" anchor="ctr"/>
-          <a:lstStyle/>
-          <a:p>
-            <a:pPr algn="ctr"/>
-            <a:endParaRPr lang="en-US"/>
           </a:p>
         </p:txBody>
       </p:sp>
@@ -5366,7 +5082,7 @@
         </p:nvCxnSpPr>
         <p:spPr>
           <a:xfrm>
-            <a:off x="9824519" y="3082974"/>
+            <a:off x="8434634" y="2222943"/>
             <a:ext cx="0" cy="2573340"/>
           </a:xfrm>
           <a:prstGeom prst="line">
@@ -5411,7 +5127,7 @@
         </p:nvCxnSpPr>
         <p:spPr>
           <a:xfrm>
-            <a:off x="9827259" y="6036632"/>
+            <a:off x="8424462" y="5786192"/>
             <a:ext cx="0" cy="2619273"/>
           </a:xfrm>
           <a:prstGeom prst="line">
@@ -5442,10 +5158,10 @@
       </p:cxnSp>
       <p:sp>
         <p:nvSpPr>
-          <p:cNvPr id="2" name="Rectangle: Rounded Corners 1">
+          <p:cNvPr id="8" name="Rectangle: Top Corners Rounded 7">
             <a:extLst>
               <a:ext uri="{FF2B5EF4-FFF2-40B4-BE49-F238E27FC236}">
-                <a16:creationId xmlns:a16="http://schemas.microsoft.com/office/drawing/2014/main" id="{E2EB2A2B-C923-A767-393C-7E3F32CFF6E3}"/>
+                <a16:creationId xmlns:a16="http://schemas.microsoft.com/office/drawing/2014/main" id="{D0F109D8-1177-ED40-FE50-EEB98F0DF418}"/>
               </a:ext>
             </a:extLst>
           </p:cNvPr>
@@ -5454,14 +5170,20 @@
         </p:nvSpPr>
         <p:spPr>
           <a:xfrm>
-            <a:off x="353605" y="2785968"/>
-            <a:ext cx="14447520" cy="142875"/>
-          </a:xfrm>
-          <a:prstGeom prst="roundRect">
-            <a:avLst>
-              <a:gd name="adj" fmla="val 0"/>
-            </a:avLst>
-          </a:prstGeom>
+            <a:off x="4019151" y="949050"/>
+            <a:ext cx="8810621" cy="820186"/>
+          </a:xfrm>
+          <a:prstGeom prst="round2SameRect">
+            <a:avLst/>
+          </a:prstGeom>
+          <a:solidFill>
+            <a:schemeClr val="bg1"/>
+          </a:solidFill>
+          <a:ln>
+            <a:solidFill>
+              <a:srgbClr val="4EA8DE"/>
+            </a:solidFill>
+          </a:ln>
         </p:spPr>
         <p:style>
           <a:lnRef idx="2">
@@ -5484,199 +5206,39 @@
           <a:lstStyle/>
           <a:p>
             <a:pPr algn="ctr"/>
-            <a:endParaRPr lang="en-US"/>
-          </a:p>
-        </p:txBody>
-      </p:sp>
-      <p:sp>
-        <p:nvSpPr>
-          <p:cNvPr id="3" name="Rectangle: Rounded Corners 2">
-            <a:extLst>
-              <a:ext uri="{FF2B5EF4-FFF2-40B4-BE49-F238E27FC236}">
-                <a16:creationId xmlns:a16="http://schemas.microsoft.com/office/drawing/2014/main" id="{2BD0529B-771F-2334-59F1-167BA5274EAF}"/>
-              </a:ext>
-            </a:extLst>
-          </p:cNvPr>
-          <p:cNvSpPr/>
-          <p:nvPr/>
-        </p:nvSpPr>
-        <p:spPr>
-          <a:xfrm>
-            <a:off x="0" y="5738358"/>
-            <a:ext cx="14447520" cy="142875"/>
-          </a:xfrm>
-          <a:prstGeom prst="roundRect">
-            <a:avLst>
-              <a:gd name="adj" fmla="val 0"/>
-            </a:avLst>
-          </a:prstGeom>
-        </p:spPr>
-        <p:style>
-          <a:lnRef idx="2">
-            <a:schemeClr val="accent1">
-              <a:shade val="15000"/>
-            </a:schemeClr>
-          </a:lnRef>
-          <a:fillRef idx="1">
-            <a:schemeClr val="accent1"/>
-          </a:fillRef>
-          <a:effectRef idx="0">
-            <a:schemeClr val="accent1"/>
-          </a:effectRef>
-          <a:fontRef idx="minor">
-            <a:schemeClr val="lt1"/>
-          </a:fontRef>
-        </p:style>
-        <p:txBody>
-          <a:bodyPr rtlCol="0" anchor="ctr"/>
-          <a:lstStyle/>
-          <a:p>
-            <a:pPr algn="ctr"/>
-            <a:endParaRPr lang="en-US"/>
-          </a:p>
-        </p:txBody>
-      </p:sp>
-      <p:sp>
-        <p:nvSpPr>
-          <p:cNvPr id="4" name="Rectangle: Rounded Corners 3">
-            <a:extLst>
-              <a:ext uri="{FF2B5EF4-FFF2-40B4-BE49-F238E27FC236}">
-                <a16:creationId xmlns:a16="http://schemas.microsoft.com/office/drawing/2014/main" id="{BD8A9918-93CC-960C-0494-74DFF53F5679}"/>
-              </a:ext>
-            </a:extLst>
-          </p:cNvPr>
-          <p:cNvSpPr/>
-          <p:nvPr/>
-        </p:nvSpPr>
-        <p:spPr>
-          <a:xfrm rot="16200000">
-            <a:off x="-2113844" y="3661763"/>
-            <a:ext cx="6521697" cy="142875"/>
-          </a:xfrm>
-          <a:prstGeom prst="roundRect">
-            <a:avLst>
-              <a:gd name="adj" fmla="val 0"/>
-            </a:avLst>
-          </a:prstGeom>
-        </p:spPr>
-        <p:style>
-          <a:lnRef idx="2">
-            <a:schemeClr val="accent1">
-              <a:shade val="15000"/>
-            </a:schemeClr>
-          </a:lnRef>
-          <a:fillRef idx="1">
-            <a:schemeClr val="accent1"/>
-          </a:fillRef>
-          <a:effectRef idx="0">
-            <a:schemeClr val="accent1"/>
-          </a:effectRef>
-          <a:fontRef idx="minor">
-            <a:schemeClr val="lt1"/>
-          </a:fontRef>
-        </p:style>
-        <p:txBody>
-          <a:bodyPr rtlCol="0" anchor="ctr"/>
-          <a:lstStyle/>
-          <a:p>
-            <a:pPr algn="ctr"/>
-            <a:endParaRPr lang="en-US"/>
-          </a:p>
-        </p:txBody>
-      </p:sp>
-      <p:sp>
-        <p:nvSpPr>
-          <p:cNvPr id="5" name="Rectangle: Rounded Corners 4">
-            <a:extLst>
-              <a:ext uri="{FF2B5EF4-FFF2-40B4-BE49-F238E27FC236}">
-                <a16:creationId xmlns:a16="http://schemas.microsoft.com/office/drawing/2014/main" id="{7601FEBD-3B6B-22AB-997B-51844B340B29}"/>
-              </a:ext>
-            </a:extLst>
-          </p:cNvPr>
-          <p:cNvSpPr/>
-          <p:nvPr/>
-        </p:nvSpPr>
-        <p:spPr>
-          <a:xfrm rot="16200000">
-            <a:off x="12482147" y="4092564"/>
-            <a:ext cx="6521697" cy="142875"/>
-          </a:xfrm>
-          <a:prstGeom prst="roundRect">
-            <a:avLst>
-              <a:gd name="adj" fmla="val 0"/>
-            </a:avLst>
-          </a:prstGeom>
-        </p:spPr>
-        <p:style>
-          <a:lnRef idx="2">
-            <a:schemeClr val="accent1">
-              <a:shade val="15000"/>
-            </a:schemeClr>
-          </a:lnRef>
-          <a:fillRef idx="1">
-            <a:schemeClr val="accent1"/>
-          </a:fillRef>
-          <a:effectRef idx="0">
-            <a:schemeClr val="accent1"/>
-          </a:effectRef>
-          <a:fontRef idx="minor">
-            <a:schemeClr val="lt1"/>
-          </a:fontRef>
-        </p:style>
-        <p:txBody>
-          <a:bodyPr rtlCol="0" anchor="ctr"/>
-          <a:lstStyle/>
-          <a:p>
-            <a:pPr algn="ctr"/>
-            <a:endParaRPr lang="en-US"/>
-          </a:p>
-        </p:txBody>
-      </p:sp>
-      <p:sp>
-        <p:nvSpPr>
-          <p:cNvPr id="6" name="Rectangle: Rounded Corners 5">
-            <a:extLst>
-              <a:ext uri="{FF2B5EF4-FFF2-40B4-BE49-F238E27FC236}">
-                <a16:creationId xmlns:a16="http://schemas.microsoft.com/office/drawing/2014/main" id="{6B6398B6-A636-638C-F199-3A8A63458FFF}"/>
-              </a:ext>
-            </a:extLst>
-          </p:cNvPr>
-          <p:cNvSpPr/>
-          <p:nvPr/>
-        </p:nvSpPr>
-        <p:spPr>
-          <a:xfrm>
-            <a:off x="798984" y="8772525"/>
-            <a:ext cx="14904720" cy="142875"/>
-          </a:xfrm>
-          <a:prstGeom prst="roundRect">
-            <a:avLst>
-              <a:gd name="adj" fmla="val 0"/>
-            </a:avLst>
-          </a:prstGeom>
-        </p:spPr>
-        <p:style>
-          <a:lnRef idx="2">
-            <a:schemeClr val="accent1">
-              <a:shade val="15000"/>
-            </a:schemeClr>
-          </a:lnRef>
-          <a:fillRef idx="1">
-            <a:schemeClr val="accent1"/>
-          </a:fillRef>
-          <a:effectRef idx="0">
-            <a:schemeClr val="accent1"/>
-          </a:effectRef>
-          <a:fontRef idx="minor">
-            <a:schemeClr val="lt1"/>
-          </a:fontRef>
-        </p:style>
-        <p:txBody>
-          <a:bodyPr rtlCol="0" anchor="ctr"/>
-          <a:lstStyle/>
-          <a:p>
-            <a:pPr algn="ctr"/>
-            <a:endParaRPr lang="en-US"/>
+            <a:endParaRPr lang="en-US">
+              <a:ln>
+                <a:gradFill>
+                  <a:gsLst>
+                    <a:gs pos="0">
+                      <a:schemeClr val="accent1">
+                        <a:lumMod val="0"/>
+                        <a:lumOff val="100000"/>
+                      </a:schemeClr>
+                    </a:gs>
+                    <a:gs pos="74000">
+                      <a:schemeClr val="accent1">
+                        <a:lumMod val="45000"/>
+                        <a:lumOff val="55000"/>
+                      </a:schemeClr>
+                    </a:gs>
+                    <a:gs pos="83000">
+                      <a:schemeClr val="accent1">
+                        <a:lumMod val="45000"/>
+                        <a:lumOff val="55000"/>
+                      </a:schemeClr>
+                    </a:gs>
+                    <a:gs pos="100000">
+                      <a:schemeClr val="accent1">
+                        <a:lumMod val="30000"/>
+                        <a:lumOff val="70000"/>
+                      </a:schemeClr>
+                    </a:gs>
+                  </a:gsLst>
+                  <a:lin ang="5400000" scaled="1"/>
+                </a:gradFill>
+              </a:ln>
+            </a:endParaRPr>
           </a:p>
         </p:txBody>
       </p:sp>
@@ -5701,7 +5263,7 @@
         <p:cNvPr id="1" name="">
           <a:extLst>
             <a:ext uri="{FF2B5EF4-FFF2-40B4-BE49-F238E27FC236}">
-              <a16:creationId xmlns:a16="http://schemas.microsoft.com/office/drawing/2014/main" id="{1F25F0C1-310B-3794-B390-DFD2D38088EE}"/>
+              <a16:creationId xmlns:a16="http://schemas.microsoft.com/office/drawing/2014/main" id="{321EC466-4754-5E97-3600-F8845E1270DA}"/>
             </a:ext>
           </a:extLst>
         </p:cNvPr>
@@ -5721,7 +5283,7 @@
           <p:cNvPr id="31" name="Rectangle: Rounded Corners 30">
             <a:extLst>
               <a:ext uri="{FF2B5EF4-FFF2-40B4-BE49-F238E27FC236}">
-                <a16:creationId xmlns:a16="http://schemas.microsoft.com/office/drawing/2014/main" id="{42A28EF7-CCA0-D559-48EB-D937A5FFC43E}"/>
+                <a16:creationId xmlns:a16="http://schemas.microsoft.com/office/drawing/2014/main" id="{BC037BD8-0CCD-E36E-A208-1B2A8EBD5E7B}"/>
               </a:ext>
             </a:extLst>
           </p:cNvPr>
@@ -5730,8 +5292,8 @@
         </p:nvSpPr>
         <p:spPr>
           <a:xfrm>
-            <a:off x="1203693" y="5784982"/>
-            <a:ext cx="14441539" cy="2972375"/>
+            <a:off x="1203693" y="5935180"/>
+            <a:ext cx="14441539" cy="2822177"/>
           </a:xfrm>
           <a:prstGeom prst="roundRect">
             <a:avLst>
@@ -5777,7 +5339,7 @@
           <p:cNvPr id="32" name="Rectangle: Rounded Corners 31">
             <a:extLst>
               <a:ext uri="{FF2B5EF4-FFF2-40B4-BE49-F238E27FC236}">
-                <a16:creationId xmlns:a16="http://schemas.microsoft.com/office/drawing/2014/main" id="{18A9D23D-474F-6113-4BDB-D6423B52E965}"/>
+                <a16:creationId xmlns:a16="http://schemas.microsoft.com/office/drawing/2014/main" id="{69F69274-B86C-BFFB-FC5C-61B0EA417031}"/>
               </a:ext>
             </a:extLst>
           </p:cNvPr>
@@ -5786,8 +5348,8 @@
         </p:nvSpPr>
         <p:spPr>
           <a:xfrm>
-            <a:off x="1224037" y="3245889"/>
-            <a:ext cx="14421195" cy="2389315"/>
+            <a:off x="1224037" y="2980220"/>
+            <a:ext cx="14421195" cy="2778849"/>
           </a:xfrm>
           <a:prstGeom prst="roundRect">
             <a:avLst>
@@ -5828,12 +5390,103 @@
           </a:p>
         </p:txBody>
       </p:sp>
-      <p:sp>
-        <p:nvSpPr>
-          <p:cNvPr id="4" name="Rectangle: Rounded Corners 3">
+      <p:cxnSp>
+        <p:nvCxnSpPr>
+          <p:cNvPr id="9" name="Straight Connector 8">
             <a:extLst>
               <a:ext uri="{FF2B5EF4-FFF2-40B4-BE49-F238E27FC236}">
-                <a16:creationId xmlns:a16="http://schemas.microsoft.com/office/drawing/2014/main" id="{CA30ED81-32A1-460C-12E7-23B2409A3D90}"/>
+                <a16:creationId xmlns:a16="http://schemas.microsoft.com/office/drawing/2014/main" id="{A92AB562-D003-F3A6-B795-69FD68D09853}"/>
+              </a:ext>
+            </a:extLst>
+          </p:cNvPr>
+          <p:cNvCxnSpPr/>
+          <p:nvPr/>
+        </p:nvCxnSpPr>
+        <p:spPr>
+          <a:xfrm>
+            <a:off x="1277815" y="37850"/>
+            <a:ext cx="0" cy="640080"/>
+          </a:xfrm>
+          <a:prstGeom prst="line">
+            <a:avLst/>
+          </a:prstGeom>
+          <a:ln w="47625">
+            <a:solidFill>
+              <a:schemeClr val="bg1"/>
+            </a:solidFill>
+          </a:ln>
+        </p:spPr>
+        <p:style>
+          <a:lnRef idx="2">
+            <a:schemeClr val="accent1"/>
+          </a:lnRef>
+          <a:fillRef idx="0">
+            <a:schemeClr val="accent1"/>
+          </a:fillRef>
+          <a:effectRef idx="1">
+            <a:schemeClr val="accent1"/>
+          </a:effectRef>
+          <a:fontRef idx="minor">
+            <a:schemeClr val="tx1"/>
+          </a:fontRef>
+        </p:style>
+      </p:cxnSp>
+      <p:sp>
+        <p:nvSpPr>
+          <p:cNvPr id="10" name="TextBox 9">
+            <a:extLst>
+              <a:ext uri="{FF2B5EF4-FFF2-40B4-BE49-F238E27FC236}">
+                <a16:creationId xmlns:a16="http://schemas.microsoft.com/office/drawing/2014/main" id="{C5208F15-D53B-D32C-8059-87D8573C74D1}"/>
+              </a:ext>
+            </a:extLst>
+          </p:cNvPr>
+          <p:cNvSpPr txBox="1"/>
+          <p:nvPr/>
+        </p:nvSpPr>
+        <p:spPr>
+          <a:xfrm>
+            <a:off x="1453661" y="82060"/>
+            <a:ext cx="2684584" cy="523220"/>
+          </a:xfrm>
+          <a:prstGeom prst="rect">
+            <a:avLst/>
+          </a:prstGeom>
+          <a:noFill/>
+        </p:spPr>
+        <p:txBody>
+          <a:bodyPr wrap="square" rtlCol="0">
+            <a:spAutoFit/>
+          </a:bodyPr>
+          <a:lstStyle/>
+          <a:p>
+            <a:r>
+              <a:rPr lang="en-US" sz="2800" dirty="0">
+                <a:solidFill>
+                  <a:schemeClr val="bg1"/>
+                </a:solidFill>
+                <a:latin typeface="Open Sans" pitchFamily="2" charset="0"/>
+                <a:ea typeface="Open Sans" pitchFamily="2" charset="0"/>
+                <a:cs typeface="Open Sans" pitchFamily="2" charset="0"/>
+              </a:rPr>
+              <a:t>Overview</a:t>
+            </a:r>
+            <a:endParaRPr lang="en-US" dirty="0">
+              <a:solidFill>
+                <a:schemeClr val="bg1"/>
+              </a:solidFill>
+              <a:latin typeface="Open Sans" pitchFamily="2" charset="0"/>
+              <a:ea typeface="Open Sans" pitchFamily="2" charset="0"/>
+              <a:cs typeface="Open Sans" pitchFamily="2" charset="0"/>
+            </a:endParaRPr>
+          </a:p>
+        </p:txBody>
+      </p:sp>
+      <p:sp>
+        <p:nvSpPr>
+          <p:cNvPr id="12" name="Rectangle: Rounded Corners 11">
+            <a:extLst>
+              <a:ext uri="{FF2B5EF4-FFF2-40B4-BE49-F238E27FC236}">
+                <a16:creationId xmlns:a16="http://schemas.microsoft.com/office/drawing/2014/main" id="{4DD55B9F-1AB7-DFC1-5505-20CBF5A485A5}"/>
               </a:ext>
             </a:extLst>
           </p:cNvPr>
@@ -5842,14 +5495,27 @@
         </p:nvSpPr>
         <p:spPr>
           <a:xfrm>
-            <a:off x="249332" y="885130"/>
-            <a:ext cx="14996160" cy="142875"/>
+            <a:off x="35167" y="952218"/>
+            <a:ext cx="1031630" cy="7805140"/>
           </a:xfrm>
           <a:prstGeom prst="roundRect">
-            <a:avLst>
-              <a:gd name="adj" fmla="val 0"/>
-            </a:avLst>
-          </a:prstGeom>
+            <a:avLst/>
+          </a:prstGeom>
+          <a:solidFill>
+            <a:srgbClr val="4EA8DE">
+              <a:alpha val="65000"/>
+            </a:srgbClr>
+          </a:solidFill>
+          <a:ln>
+            <a:noFill/>
+          </a:ln>
+          <a:effectLst>
+            <a:outerShdw blurRad="50800" dist="38100" dir="5400000" algn="t" rotWithShape="0">
+              <a:prstClr val="black">
+                <a:alpha val="40000"/>
+              </a:prstClr>
+            </a:outerShdw>
+          </a:effectLst>
         </p:spPr>
         <p:style>
           <a:lnRef idx="2">
@@ -5878,10 +5544,57 @@
       </p:sp>
       <p:sp>
         <p:nvSpPr>
-          <p:cNvPr id="5" name="Rectangle: Rounded Corners 4">
+          <p:cNvPr id="11" name="TextBox 10">
             <a:extLst>
               <a:ext uri="{FF2B5EF4-FFF2-40B4-BE49-F238E27FC236}">
-                <a16:creationId xmlns:a16="http://schemas.microsoft.com/office/drawing/2014/main" id="{2BC83B3A-0961-B71A-E0EC-79006E86D1B9}"/>
+                <a16:creationId xmlns:a16="http://schemas.microsoft.com/office/drawing/2014/main" id="{12BD02E6-BDE5-8013-1B98-5F0BFB218507}"/>
+              </a:ext>
+            </a:extLst>
+          </p:cNvPr>
+          <p:cNvSpPr txBox="1"/>
+          <p:nvPr/>
+        </p:nvSpPr>
+        <p:spPr>
+          <a:xfrm>
+            <a:off x="1203693" y="179965"/>
+            <a:ext cx="3083170" cy="584775"/>
+          </a:xfrm>
+          <a:prstGeom prst="rect">
+            <a:avLst/>
+          </a:prstGeom>
+          <a:noFill/>
+          <a:ln>
+            <a:noFill/>
+          </a:ln>
+        </p:spPr>
+        <p:txBody>
+          <a:bodyPr wrap="square" rtlCol="0">
+            <a:spAutoFit/>
+          </a:bodyPr>
+          <a:lstStyle/>
+          <a:p>
+            <a:r>
+              <a:rPr lang="en-US" sz="3200" dirty="0">
+                <a:latin typeface="Open Sans" pitchFamily="2" charset="0"/>
+                <a:ea typeface="Open Sans" pitchFamily="2" charset="0"/>
+                <a:cs typeface="Open Sans" pitchFamily="2" charset="0"/>
+              </a:rPr>
+              <a:t>Overview</a:t>
+            </a:r>
+            <a:endParaRPr lang="en-US" dirty="0">
+              <a:latin typeface="Open Sans" pitchFamily="2" charset="0"/>
+              <a:ea typeface="Open Sans" pitchFamily="2" charset="0"/>
+              <a:cs typeface="Open Sans" pitchFamily="2" charset="0"/>
+            </a:endParaRPr>
+          </a:p>
+        </p:txBody>
+      </p:sp>
+      <p:sp>
+        <p:nvSpPr>
+          <p:cNvPr id="14" name="Rectangle: Rounded Corners 13">
+            <a:extLst>
+              <a:ext uri="{FF2B5EF4-FFF2-40B4-BE49-F238E27FC236}">
+                <a16:creationId xmlns:a16="http://schemas.microsoft.com/office/drawing/2014/main" id="{658E5FEA-1F18-02BD-32CB-BF8951B5FBD2}"/>
               </a:ext>
             </a:extLst>
           </p:cNvPr>
@@ -5889,9 +5602,415 @@
           <p:nvPr/>
         </p:nvSpPr>
         <p:spPr>
-          <a:xfrm rot="16200000">
-            <a:off x="-2102269" y="3612452"/>
-            <a:ext cx="6521697" cy="142875"/>
+          <a:xfrm>
+            <a:off x="1250363" y="952218"/>
+            <a:ext cx="2715314" cy="1828800"/>
+          </a:xfrm>
+          <a:prstGeom prst="roundRect">
+            <a:avLst>
+              <a:gd name="adj" fmla="val 5556"/>
+            </a:avLst>
+          </a:prstGeom>
+          <a:ln>
+            <a:noFill/>
+          </a:ln>
+          <a:effectLst>
+            <a:outerShdw blurRad="50800" dist="38100" dir="2700000" algn="tl" rotWithShape="0">
+              <a:prstClr val="black">
+                <a:alpha val="40000"/>
+              </a:prstClr>
+            </a:outerShdw>
+          </a:effectLst>
+        </p:spPr>
+        <p:style>
+          <a:lnRef idx="2">
+            <a:schemeClr val="accent6"/>
+          </a:lnRef>
+          <a:fillRef idx="1">
+            <a:schemeClr val="lt1"/>
+          </a:fillRef>
+          <a:effectRef idx="0">
+            <a:schemeClr val="accent6"/>
+          </a:effectRef>
+          <a:fontRef idx="minor">
+            <a:schemeClr val="dk1"/>
+          </a:fontRef>
+        </p:style>
+        <p:txBody>
+          <a:bodyPr rtlCol="0" anchor="ctr"/>
+          <a:lstStyle/>
+          <a:p>
+            <a:pPr algn="ctr"/>
+            <a:endParaRPr lang="en-US"/>
+          </a:p>
+        </p:txBody>
+      </p:sp>
+      <p:sp>
+        <p:nvSpPr>
+          <p:cNvPr id="23" name="Rectangle: Rounded Corners 22">
+            <a:extLst>
+              <a:ext uri="{FF2B5EF4-FFF2-40B4-BE49-F238E27FC236}">
+                <a16:creationId xmlns:a16="http://schemas.microsoft.com/office/drawing/2014/main" id="{20367833-F99F-6C50-8EE1-E4361171054D}"/>
+              </a:ext>
+            </a:extLst>
+          </p:cNvPr>
+          <p:cNvSpPr/>
+          <p:nvPr/>
+        </p:nvSpPr>
+        <p:spPr>
+          <a:xfrm>
+            <a:off x="12968045" y="952218"/>
+            <a:ext cx="2715314" cy="1828800"/>
+          </a:xfrm>
+          <a:prstGeom prst="roundRect">
+            <a:avLst>
+              <a:gd name="adj" fmla="val 5556"/>
+            </a:avLst>
+          </a:prstGeom>
+          <a:ln>
+            <a:noFill/>
+          </a:ln>
+          <a:effectLst>
+            <a:outerShdw blurRad="50800" dist="38100" dir="2700000" algn="tl" rotWithShape="0">
+              <a:prstClr val="black">
+                <a:alpha val="40000"/>
+              </a:prstClr>
+            </a:outerShdw>
+          </a:effectLst>
+        </p:spPr>
+        <p:style>
+          <a:lnRef idx="2">
+            <a:schemeClr val="accent6"/>
+          </a:lnRef>
+          <a:fillRef idx="1">
+            <a:schemeClr val="lt1"/>
+          </a:fillRef>
+          <a:effectRef idx="0">
+            <a:schemeClr val="accent6"/>
+          </a:effectRef>
+          <a:fontRef idx="minor">
+            <a:schemeClr val="dk1"/>
+          </a:fontRef>
+        </p:style>
+        <p:txBody>
+          <a:bodyPr rtlCol="0" anchor="ctr"/>
+          <a:lstStyle/>
+          <a:p>
+            <a:pPr algn="ctr"/>
+            <a:endParaRPr lang="en-US"/>
+          </a:p>
+        </p:txBody>
+      </p:sp>
+      <p:sp>
+        <p:nvSpPr>
+          <p:cNvPr id="24" name="Rectangle: Rounded Corners 23">
+            <a:extLst>
+              <a:ext uri="{FF2B5EF4-FFF2-40B4-BE49-F238E27FC236}">
+                <a16:creationId xmlns:a16="http://schemas.microsoft.com/office/drawing/2014/main" id="{D5670DB2-27D0-D8D3-A0FF-6691F2C59894}"/>
+              </a:ext>
+            </a:extLst>
+          </p:cNvPr>
+          <p:cNvSpPr/>
+          <p:nvPr/>
+        </p:nvSpPr>
+        <p:spPr>
+          <a:xfrm>
+            <a:off x="4179784" y="952218"/>
+            <a:ext cx="2715314" cy="1828800"/>
+          </a:xfrm>
+          <a:prstGeom prst="roundRect">
+            <a:avLst>
+              <a:gd name="adj" fmla="val 5556"/>
+            </a:avLst>
+          </a:prstGeom>
+          <a:ln>
+            <a:noFill/>
+          </a:ln>
+          <a:effectLst>
+            <a:outerShdw blurRad="50800" dist="38100" dir="2700000" algn="tl" rotWithShape="0">
+              <a:prstClr val="black">
+                <a:alpha val="40000"/>
+              </a:prstClr>
+            </a:outerShdw>
+          </a:effectLst>
+        </p:spPr>
+        <p:style>
+          <a:lnRef idx="2">
+            <a:schemeClr val="accent6"/>
+          </a:lnRef>
+          <a:fillRef idx="1">
+            <a:schemeClr val="lt1"/>
+          </a:fillRef>
+          <a:effectRef idx="0">
+            <a:schemeClr val="accent6"/>
+          </a:effectRef>
+          <a:fontRef idx="minor">
+            <a:schemeClr val="dk1"/>
+          </a:fontRef>
+        </p:style>
+        <p:txBody>
+          <a:bodyPr rtlCol="0" anchor="ctr"/>
+          <a:lstStyle/>
+          <a:p>
+            <a:pPr algn="ctr"/>
+            <a:endParaRPr lang="en-US"/>
+          </a:p>
+        </p:txBody>
+      </p:sp>
+      <p:sp>
+        <p:nvSpPr>
+          <p:cNvPr id="25" name="Rectangle: Rounded Corners 24">
+            <a:extLst>
+              <a:ext uri="{FF2B5EF4-FFF2-40B4-BE49-F238E27FC236}">
+                <a16:creationId xmlns:a16="http://schemas.microsoft.com/office/drawing/2014/main" id="{DDB23919-EC29-E267-65FD-25F138895D86}"/>
+              </a:ext>
+            </a:extLst>
+          </p:cNvPr>
+          <p:cNvSpPr/>
+          <p:nvPr/>
+        </p:nvSpPr>
+        <p:spPr>
+          <a:xfrm>
+            <a:off x="7109205" y="952218"/>
+            <a:ext cx="2715314" cy="1828800"/>
+          </a:xfrm>
+          <a:prstGeom prst="roundRect">
+            <a:avLst>
+              <a:gd name="adj" fmla="val 5556"/>
+            </a:avLst>
+          </a:prstGeom>
+          <a:ln>
+            <a:noFill/>
+          </a:ln>
+          <a:effectLst>
+            <a:outerShdw blurRad="50800" dist="38100" dir="2700000" algn="tl" rotWithShape="0">
+              <a:prstClr val="black">
+                <a:alpha val="40000"/>
+              </a:prstClr>
+            </a:outerShdw>
+          </a:effectLst>
+        </p:spPr>
+        <p:style>
+          <a:lnRef idx="2">
+            <a:schemeClr val="accent6"/>
+          </a:lnRef>
+          <a:fillRef idx="1">
+            <a:schemeClr val="lt1"/>
+          </a:fillRef>
+          <a:effectRef idx="0">
+            <a:schemeClr val="accent6"/>
+          </a:effectRef>
+          <a:fontRef idx="minor">
+            <a:schemeClr val="dk1"/>
+          </a:fontRef>
+        </p:style>
+        <p:txBody>
+          <a:bodyPr rtlCol="0" anchor="ctr"/>
+          <a:lstStyle/>
+          <a:p>
+            <a:pPr algn="ctr"/>
+            <a:endParaRPr lang="en-US"/>
+          </a:p>
+        </p:txBody>
+      </p:sp>
+      <p:sp>
+        <p:nvSpPr>
+          <p:cNvPr id="26" name="Rectangle: Rounded Corners 25">
+            <a:extLst>
+              <a:ext uri="{FF2B5EF4-FFF2-40B4-BE49-F238E27FC236}">
+                <a16:creationId xmlns:a16="http://schemas.microsoft.com/office/drawing/2014/main" id="{9C5C6A7F-648C-1663-904E-6868E6782590}"/>
+              </a:ext>
+            </a:extLst>
+          </p:cNvPr>
+          <p:cNvSpPr/>
+          <p:nvPr/>
+        </p:nvSpPr>
+        <p:spPr>
+          <a:xfrm>
+            <a:off x="10038626" y="952218"/>
+            <a:ext cx="2715314" cy="1828800"/>
+          </a:xfrm>
+          <a:prstGeom prst="roundRect">
+            <a:avLst>
+              <a:gd name="adj" fmla="val 5556"/>
+            </a:avLst>
+          </a:prstGeom>
+          <a:ln>
+            <a:noFill/>
+          </a:ln>
+          <a:effectLst>
+            <a:outerShdw blurRad="50800" dist="38100" dir="2700000" algn="tl" rotWithShape="0">
+              <a:prstClr val="black">
+                <a:alpha val="40000"/>
+              </a:prstClr>
+            </a:outerShdw>
+          </a:effectLst>
+        </p:spPr>
+        <p:style>
+          <a:lnRef idx="2">
+            <a:schemeClr val="accent6"/>
+          </a:lnRef>
+          <a:fillRef idx="1">
+            <a:schemeClr val="lt1"/>
+          </a:fillRef>
+          <a:effectRef idx="0">
+            <a:schemeClr val="accent6"/>
+          </a:effectRef>
+          <a:fontRef idx="minor">
+            <a:schemeClr val="dk1"/>
+          </a:fontRef>
+        </p:style>
+        <p:txBody>
+          <a:bodyPr rtlCol="0" anchor="ctr"/>
+          <a:lstStyle/>
+          <a:p>
+            <a:pPr algn="ctr"/>
+            <a:endParaRPr lang="en-US"/>
+          </a:p>
+        </p:txBody>
+      </p:sp>
+      <p:pic>
+        <p:nvPicPr>
+          <p:cNvPr id="37" name="Picture 36" descr="A blue squares on a black background&#10;&#10;AI-generated content may be incorrect.">
+            <a:extLst>
+              <a:ext uri="{FF2B5EF4-FFF2-40B4-BE49-F238E27FC236}">
+                <a16:creationId xmlns:a16="http://schemas.microsoft.com/office/drawing/2014/main" id="{71BD89FB-B091-3A2A-D400-AEF82458BAA1}"/>
+              </a:ext>
+            </a:extLst>
+          </p:cNvPr>
+          <p:cNvPicPr>
+            <a:picLocks noChangeAspect="1"/>
+          </p:cNvPicPr>
+          <p:nvPr/>
+        </p:nvPicPr>
+        <p:blipFill>
+          <a:blip r:embed="rId2">
+            <a:extLst>
+              <a:ext uri="{28A0092B-C50C-407E-A947-70E740481C1C}">
+                <a14:useLocalDpi xmlns:a14="http://schemas.microsoft.com/office/drawing/2010/main" val="0"/>
+              </a:ext>
+            </a:extLst>
+          </a:blip>
+          <a:stretch>
+            <a:fillRect/>
+          </a:stretch>
+        </p:blipFill>
+        <p:spPr>
+          <a:xfrm>
+            <a:off x="120181" y="41551"/>
+            <a:ext cx="861602" cy="861602"/>
+          </a:xfrm>
+          <a:prstGeom prst="rect">
+            <a:avLst/>
+          </a:prstGeom>
+        </p:spPr>
+      </p:pic>
+      <p:cxnSp>
+        <p:nvCxnSpPr>
+          <p:cNvPr id="39" name="Straight Connector 38">
+            <a:extLst>
+              <a:ext uri="{FF2B5EF4-FFF2-40B4-BE49-F238E27FC236}">
+                <a16:creationId xmlns:a16="http://schemas.microsoft.com/office/drawing/2014/main" id="{0A12C5E6-6350-CB4B-757B-06C81CF6E228}"/>
+              </a:ext>
+            </a:extLst>
+          </p:cNvPr>
+          <p:cNvCxnSpPr>
+            <a:cxnSpLocks/>
+          </p:cNvCxnSpPr>
+          <p:nvPr/>
+        </p:nvCxnSpPr>
+        <p:spPr>
+          <a:xfrm>
+            <a:off x="9824519" y="3082974"/>
+            <a:ext cx="0" cy="2573340"/>
+          </a:xfrm>
+          <a:prstGeom prst="line">
+            <a:avLst/>
+          </a:prstGeom>
+          <a:ln>
+            <a:solidFill>
+              <a:srgbClr val="4EA8DE">
+                <a:alpha val="65000"/>
+              </a:srgbClr>
+            </a:solidFill>
+          </a:ln>
+        </p:spPr>
+        <p:style>
+          <a:lnRef idx="2">
+            <a:schemeClr val="accent1"/>
+          </a:lnRef>
+          <a:fillRef idx="0">
+            <a:schemeClr val="accent1"/>
+          </a:fillRef>
+          <a:effectRef idx="1">
+            <a:schemeClr val="accent1"/>
+          </a:effectRef>
+          <a:fontRef idx="minor">
+            <a:schemeClr val="tx1"/>
+          </a:fontRef>
+        </p:style>
+      </p:cxnSp>
+      <p:cxnSp>
+        <p:nvCxnSpPr>
+          <p:cNvPr id="40" name="Straight Connector 39">
+            <a:extLst>
+              <a:ext uri="{FF2B5EF4-FFF2-40B4-BE49-F238E27FC236}">
+                <a16:creationId xmlns:a16="http://schemas.microsoft.com/office/drawing/2014/main" id="{186B1265-7668-498B-0994-4A1011DEC721}"/>
+              </a:ext>
+            </a:extLst>
+          </p:cNvPr>
+          <p:cNvCxnSpPr>
+            <a:cxnSpLocks/>
+          </p:cNvCxnSpPr>
+          <p:nvPr/>
+        </p:nvCxnSpPr>
+        <p:spPr>
+          <a:xfrm>
+            <a:off x="9827259" y="6036632"/>
+            <a:ext cx="0" cy="2619273"/>
+          </a:xfrm>
+          <a:prstGeom prst="line">
+            <a:avLst/>
+          </a:prstGeom>
+          <a:ln>
+            <a:solidFill>
+              <a:srgbClr val="4EA8DE">
+                <a:alpha val="65000"/>
+              </a:srgbClr>
+            </a:solidFill>
+          </a:ln>
+        </p:spPr>
+        <p:style>
+          <a:lnRef idx="2">
+            <a:schemeClr val="accent1"/>
+          </a:lnRef>
+          <a:fillRef idx="0">
+            <a:schemeClr val="accent1"/>
+          </a:fillRef>
+          <a:effectRef idx="1">
+            <a:schemeClr val="accent1"/>
+          </a:effectRef>
+          <a:fontRef idx="minor">
+            <a:schemeClr val="tx1"/>
+          </a:fontRef>
+        </p:style>
+      </p:cxnSp>
+      <p:sp>
+        <p:nvSpPr>
+          <p:cNvPr id="2" name="Rectangle: Rounded Corners 1">
+            <a:extLst>
+              <a:ext uri="{FF2B5EF4-FFF2-40B4-BE49-F238E27FC236}">
+                <a16:creationId xmlns:a16="http://schemas.microsoft.com/office/drawing/2014/main" id="{E6EA0952-BF0D-B25E-2289-E9DC2D8A4672}"/>
+              </a:ext>
+            </a:extLst>
+          </p:cNvPr>
+          <p:cNvSpPr/>
+          <p:nvPr/>
+        </p:nvSpPr>
+        <p:spPr>
+          <a:xfrm>
+            <a:off x="353605" y="2785968"/>
+            <a:ext cx="14447520" cy="142875"/>
           </a:xfrm>
           <a:prstGeom prst="roundRect">
             <a:avLst>
@@ -5924,103 +6043,12 @@
           </a:p>
         </p:txBody>
       </p:sp>
-      <p:cxnSp>
-        <p:nvCxnSpPr>
-          <p:cNvPr id="9" name="Straight Connector 8">
+      <p:sp>
+        <p:nvSpPr>
+          <p:cNvPr id="3" name="Rectangle: Rounded Corners 2">
             <a:extLst>
               <a:ext uri="{FF2B5EF4-FFF2-40B4-BE49-F238E27FC236}">
-                <a16:creationId xmlns:a16="http://schemas.microsoft.com/office/drawing/2014/main" id="{10B54D34-575F-E014-B2EA-A5824D3118D6}"/>
-              </a:ext>
-            </a:extLst>
-          </p:cNvPr>
-          <p:cNvCxnSpPr/>
-          <p:nvPr/>
-        </p:nvCxnSpPr>
-        <p:spPr>
-          <a:xfrm>
-            <a:off x="1277815" y="37850"/>
-            <a:ext cx="0" cy="640080"/>
-          </a:xfrm>
-          <a:prstGeom prst="line">
-            <a:avLst/>
-          </a:prstGeom>
-          <a:ln w="47625">
-            <a:solidFill>
-              <a:schemeClr val="bg1"/>
-            </a:solidFill>
-          </a:ln>
-        </p:spPr>
-        <p:style>
-          <a:lnRef idx="2">
-            <a:schemeClr val="accent1"/>
-          </a:lnRef>
-          <a:fillRef idx="0">
-            <a:schemeClr val="accent1"/>
-          </a:fillRef>
-          <a:effectRef idx="1">
-            <a:schemeClr val="accent1"/>
-          </a:effectRef>
-          <a:fontRef idx="minor">
-            <a:schemeClr val="tx1"/>
-          </a:fontRef>
-        </p:style>
-      </p:cxnSp>
-      <p:sp>
-        <p:nvSpPr>
-          <p:cNvPr id="10" name="TextBox 9">
-            <a:extLst>
-              <a:ext uri="{FF2B5EF4-FFF2-40B4-BE49-F238E27FC236}">
-                <a16:creationId xmlns:a16="http://schemas.microsoft.com/office/drawing/2014/main" id="{6F4A792E-7DC4-B84B-1D3B-0B07DDD0ADB4}"/>
-              </a:ext>
-            </a:extLst>
-          </p:cNvPr>
-          <p:cNvSpPr txBox="1"/>
-          <p:nvPr/>
-        </p:nvSpPr>
-        <p:spPr>
-          <a:xfrm>
-            <a:off x="1453661" y="82060"/>
-            <a:ext cx="2684584" cy="523220"/>
-          </a:xfrm>
-          <a:prstGeom prst="rect">
-            <a:avLst/>
-          </a:prstGeom>
-          <a:noFill/>
-        </p:spPr>
-        <p:txBody>
-          <a:bodyPr wrap="square" rtlCol="0">
-            <a:spAutoFit/>
-          </a:bodyPr>
-          <a:lstStyle/>
-          <a:p>
-            <a:r>
-              <a:rPr lang="en-US" sz="2800" dirty="0">
-                <a:solidFill>
-                  <a:schemeClr val="bg1"/>
-                </a:solidFill>
-                <a:latin typeface="Open Sans" pitchFamily="2" charset="0"/>
-                <a:ea typeface="Open Sans" pitchFamily="2" charset="0"/>
-                <a:cs typeface="Open Sans" pitchFamily="2" charset="0"/>
-              </a:rPr>
-              <a:t>Overview</a:t>
-            </a:r>
-            <a:endParaRPr lang="en-US" dirty="0">
-              <a:solidFill>
-                <a:schemeClr val="bg1"/>
-              </a:solidFill>
-              <a:latin typeface="Open Sans" pitchFamily="2" charset="0"/>
-              <a:ea typeface="Open Sans" pitchFamily="2" charset="0"/>
-              <a:cs typeface="Open Sans" pitchFamily="2" charset="0"/>
-            </a:endParaRPr>
-          </a:p>
-        </p:txBody>
-      </p:sp>
-      <p:sp>
-        <p:nvSpPr>
-          <p:cNvPr id="12" name="Rectangle: Rounded Corners 11">
-            <a:extLst>
-              <a:ext uri="{FF2B5EF4-FFF2-40B4-BE49-F238E27FC236}">
-                <a16:creationId xmlns:a16="http://schemas.microsoft.com/office/drawing/2014/main" id="{FB7A27FF-BD3F-EF10-1D25-C82A9F5B3B55}"/>
+                <a16:creationId xmlns:a16="http://schemas.microsoft.com/office/drawing/2014/main" id="{24EAE022-CCB3-847D-DD41-E68F660B441B}"/>
               </a:ext>
             </a:extLst>
           </p:cNvPr>
@@ -6029,27 +6057,14 @@
         </p:nvSpPr>
         <p:spPr>
           <a:xfrm>
-            <a:off x="35167" y="952218"/>
-            <a:ext cx="1031630" cy="7805140"/>
+            <a:off x="0" y="5738358"/>
+            <a:ext cx="14447520" cy="142875"/>
           </a:xfrm>
           <a:prstGeom prst="roundRect">
-            <a:avLst/>
-          </a:prstGeom>
-          <a:solidFill>
-            <a:schemeClr val="accent1">
-              <a:alpha val="64000"/>
-            </a:schemeClr>
-          </a:solidFill>
-          <a:ln>
-            <a:noFill/>
-          </a:ln>
-          <a:effectLst>
-            <a:outerShdw blurRad="50800" dist="38100" dir="5400000" algn="t" rotWithShape="0">
-              <a:prstClr val="black">
-                <a:alpha val="40000"/>
-              </a:prstClr>
-            </a:outerShdw>
-          </a:effectLst>
+            <a:avLst>
+              <a:gd name="adj" fmla="val 0"/>
+            </a:avLst>
+          </a:prstGeom>
         </p:spPr>
         <p:style>
           <a:lnRef idx="2">
@@ -6078,10 +6093,10 @@
       </p:sp>
       <p:sp>
         <p:nvSpPr>
-          <p:cNvPr id="13" name="Rectangle: Rounded Corners 12">
+          <p:cNvPr id="4" name="Rectangle: Rounded Corners 3">
             <a:extLst>
               <a:ext uri="{FF2B5EF4-FFF2-40B4-BE49-F238E27FC236}">
-                <a16:creationId xmlns:a16="http://schemas.microsoft.com/office/drawing/2014/main" id="{0D40867E-FE83-1886-B12E-25F2C971F6AD}"/>
+                <a16:creationId xmlns:a16="http://schemas.microsoft.com/office/drawing/2014/main" id="{B0412BE8-3C4A-C6FD-7ADB-A71208285203}"/>
               </a:ext>
             </a:extLst>
           </p:cNvPr>
@@ -6089,18 +6104,15 @@
           <p:nvPr/>
         </p:nvSpPr>
         <p:spPr>
-          <a:xfrm>
-            <a:off x="0" y="-32145"/>
-            <a:ext cx="15849600" cy="910372"/>
+          <a:xfrm rot="16200000">
+            <a:off x="-2113844" y="3661763"/>
+            <a:ext cx="6521697" cy="142875"/>
           </a:xfrm>
           <a:prstGeom prst="roundRect">
             <a:avLst>
               <a:gd name="adj" fmla="val 0"/>
             </a:avLst>
           </a:prstGeom>
-          <a:ln>
-            <a:noFill/>
-          </a:ln>
         </p:spPr>
         <p:style>
           <a:lnRef idx="2">
@@ -6129,60 +6141,10 @@
       </p:sp>
       <p:sp>
         <p:nvSpPr>
-          <p:cNvPr id="11" name="TextBox 10">
+          <p:cNvPr id="5" name="Rectangle: Rounded Corners 4">
             <a:extLst>
               <a:ext uri="{FF2B5EF4-FFF2-40B4-BE49-F238E27FC236}">
-                <a16:creationId xmlns:a16="http://schemas.microsoft.com/office/drawing/2014/main" id="{55A9717F-11FF-3EBA-DF18-2B8B9A714A7D}"/>
-              </a:ext>
-            </a:extLst>
-          </p:cNvPr>
-          <p:cNvSpPr txBox="1"/>
-          <p:nvPr/>
-        </p:nvSpPr>
-        <p:spPr>
-          <a:xfrm>
-            <a:off x="771869" y="82060"/>
-            <a:ext cx="3083170" cy="584775"/>
-          </a:xfrm>
-          <a:prstGeom prst="rect">
-            <a:avLst/>
-          </a:prstGeom>
-          <a:noFill/>
-        </p:spPr>
-        <p:txBody>
-          <a:bodyPr wrap="square" rtlCol="0">
-            <a:spAutoFit/>
-          </a:bodyPr>
-          <a:lstStyle/>
-          <a:p>
-            <a:r>
-              <a:rPr lang="en-US" sz="3200" dirty="0">
-                <a:solidFill>
-                  <a:schemeClr val="bg1"/>
-                </a:solidFill>
-                <a:latin typeface="Open Sans" pitchFamily="2" charset="0"/>
-                <a:ea typeface="Open Sans" pitchFamily="2" charset="0"/>
-                <a:cs typeface="Open Sans" pitchFamily="2" charset="0"/>
-              </a:rPr>
-              <a:t>Overview</a:t>
-            </a:r>
-            <a:endParaRPr lang="en-US" dirty="0">
-              <a:solidFill>
-                <a:schemeClr val="bg1"/>
-              </a:solidFill>
-              <a:latin typeface="Open Sans" pitchFamily="2" charset="0"/>
-              <a:ea typeface="Open Sans" pitchFamily="2" charset="0"/>
-              <a:cs typeface="Open Sans" pitchFamily="2" charset="0"/>
-            </a:endParaRPr>
-          </a:p>
-        </p:txBody>
-      </p:sp>
-      <p:sp>
-        <p:nvSpPr>
-          <p:cNvPr id="14" name="Rectangle: Rounded Corners 13">
-            <a:extLst>
-              <a:ext uri="{FF2B5EF4-FFF2-40B4-BE49-F238E27FC236}">
-                <a16:creationId xmlns:a16="http://schemas.microsoft.com/office/drawing/2014/main" id="{3327C3C9-FEC4-83EF-1BFB-19C2996C79C9}"/>
+                <a16:creationId xmlns:a16="http://schemas.microsoft.com/office/drawing/2014/main" id="{EA05A776-1F05-816A-C908-52CCD6E3733B}"/>
               </a:ext>
             </a:extLst>
           </p:cNvPr>
@@ -6190,64 +6152,8 @@
           <p:nvPr/>
         </p:nvSpPr>
         <p:spPr>
-          <a:xfrm>
-            <a:off x="1250363" y="1023961"/>
-            <a:ext cx="2715314" cy="2057400"/>
-          </a:xfrm>
-          <a:prstGeom prst="roundRect">
-            <a:avLst>
-              <a:gd name="adj" fmla="val 5556"/>
-            </a:avLst>
-          </a:prstGeom>
-          <a:ln>
-            <a:noFill/>
-          </a:ln>
-          <a:effectLst>
-            <a:outerShdw blurRad="50800" dist="38100" dir="2700000" algn="tl" rotWithShape="0">
-              <a:prstClr val="black">
-                <a:alpha val="40000"/>
-              </a:prstClr>
-            </a:outerShdw>
-          </a:effectLst>
-        </p:spPr>
-        <p:style>
-          <a:lnRef idx="2">
-            <a:schemeClr val="accent6"/>
-          </a:lnRef>
-          <a:fillRef idx="1">
-            <a:schemeClr val="lt1"/>
-          </a:fillRef>
-          <a:effectRef idx="0">
-            <a:schemeClr val="accent6"/>
-          </a:effectRef>
-          <a:fontRef idx="minor">
-            <a:schemeClr val="dk1"/>
-          </a:fontRef>
-        </p:style>
-        <p:txBody>
-          <a:bodyPr rtlCol="0" anchor="ctr"/>
-          <a:lstStyle/>
-          <a:p>
-            <a:pPr algn="ctr"/>
-            <a:endParaRPr lang="en-US"/>
-          </a:p>
-        </p:txBody>
-      </p:sp>
-      <p:sp>
-        <p:nvSpPr>
-          <p:cNvPr id="22" name="Rectangle: Rounded Corners 21">
-            <a:extLst>
-              <a:ext uri="{FF2B5EF4-FFF2-40B4-BE49-F238E27FC236}">
-                <a16:creationId xmlns:a16="http://schemas.microsoft.com/office/drawing/2014/main" id="{BCDFEEAF-05FD-FAB8-A59E-D944CC09C503}"/>
-              </a:ext>
-            </a:extLst>
-          </p:cNvPr>
-          <p:cNvSpPr/>
-          <p:nvPr/>
-        </p:nvSpPr>
-        <p:spPr>
           <a:xfrm rot="16200000">
-            <a:off x="12514293" y="3612452"/>
+            <a:off x="12482147" y="4092564"/>
             <a:ext cx="6521697" cy="142875"/>
           </a:xfrm>
           <a:prstGeom prst="roundRect">
@@ -6283,10 +6189,10 @@
       </p:sp>
       <p:sp>
         <p:nvSpPr>
-          <p:cNvPr id="23" name="Rectangle: Rounded Corners 22">
+          <p:cNvPr id="6" name="Rectangle: Rounded Corners 5">
             <a:extLst>
               <a:ext uri="{FF2B5EF4-FFF2-40B4-BE49-F238E27FC236}">
-                <a16:creationId xmlns:a16="http://schemas.microsoft.com/office/drawing/2014/main" id="{80F8E46B-5805-37C2-18F8-8F3F17E16CD6}"/>
+                <a16:creationId xmlns:a16="http://schemas.microsoft.com/office/drawing/2014/main" id="{B84C7624-875B-699E-8009-06546F076E04}"/>
               </a:ext>
             </a:extLst>
           </p:cNvPr>
@@ -6295,232 +6201,8 @@
         </p:nvSpPr>
         <p:spPr>
           <a:xfrm>
-            <a:off x="12968045" y="1023961"/>
-            <a:ext cx="2715314" cy="2057400"/>
-          </a:xfrm>
-          <a:prstGeom prst="roundRect">
-            <a:avLst>
-              <a:gd name="adj" fmla="val 5556"/>
-            </a:avLst>
-          </a:prstGeom>
-          <a:ln>
-            <a:noFill/>
-          </a:ln>
-          <a:effectLst>
-            <a:outerShdw blurRad="50800" dist="38100" dir="2700000" algn="tl" rotWithShape="0">
-              <a:prstClr val="black">
-                <a:alpha val="40000"/>
-              </a:prstClr>
-            </a:outerShdw>
-          </a:effectLst>
-        </p:spPr>
-        <p:style>
-          <a:lnRef idx="2">
-            <a:schemeClr val="accent6"/>
-          </a:lnRef>
-          <a:fillRef idx="1">
-            <a:schemeClr val="lt1"/>
-          </a:fillRef>
-          <a:effectRef idx="0">
-            <a:schemeClr val="accent6"/>
-          </a:effectRef>
-          <a:fontRef idx="minor">
-            <a:schemeClr val="dk1"/>
-          </a:fontRef>
-        </p:style>
-        <p:txBody>
-          <a:bodyPr rtlCol="0" anchor="ctr"/>
-          <a:lstStyle/>
-          <a:p>
-            <a:pPr algn="ctr"/>
-            <a:endParaRPr lang="en-US"/>
-          </a:p>
-        </p:txBody>
-      </p:sp>
-      <p:sp>
-        <p:nvSpPr>
-          <p:cNvPr id="24" name="Rectangle: Rounded Corners 23">
-            <a:extLst>
-              <a:ext uri="{FF2B5EF4-FFF2-40B4-BE49-F238E27FC236}">
-                <a16:creationId xmlns:a16="http://schemas.microsoft.com/office/drawing/2014/main" id="{95832337-E203-C460-5ADF-72B023545235}"/>
-              </a:ext>
-            </a:extLst>
-          </p:cNvPr>
-          <p:cNvSpPr/>
-          <p:nvPr/>
-        </p:nvSpPr>
-        <p:spPr>
-          <a:xfrm>
-            <a:off x="4179784" y="1023961"/>
-            <a:ext cx="2715314" cy="2057400"/>
-          </a:xfrm>
-          <a:prstGeom prst="roundRect">
-            <a:avLst>
-              <a:gd name="adj" fmla="val 5556"/>
-            </a:avLst>
-          </a:prstGeom>
-          <a:ln>
-            <a:noFill/>
-          </a:ln>
-          <a:effectLst>
-            <a:outerShdw blurRad="50800" dist="38100" dir="2700000" algn="tl" rotWithShape="0">
-              <a:prstClr val="black">
-                <a:alpha val="40000"/>
-              </a:prstClr>
-            </a:outerShdw>
-          </a:effectLst>
-        </p:spPr>
-        <p:style>
-          <a:lnRef idx="2">
-            <a:schemeClr val="accent6"/>
-          </a:lnRef>
-          <a:fillRef idx="1">
-            <a:schemeClr val="lt1"/>
-          </a:fillRef>
-          <a:effectRef idx="0">
-            <a:schemeClr val="accent6"/>
-          </a:effectRef>
-          <a:fontRef idx="minor">
-            <a:schemeClr val="dk1"/>
-          </a:fontRef>
-        </p:style>
-        <p:txBody>
-          <a:bodyPr rtlCol="0" anchor="ctr"/>
-          <a:lstStyle/>
-          <a:p>
-            <a:pPr algn="ctr"/>
-            <a:endParaRPr lang="en-US"/>
-          </a:p>
-        </p:txBody>
-      </p:sp>
-      <p:sp>
-        <p:nvSpPr>
-          <p:cNvPr id="25" name="Rectangle: Rounded Corners 24">
-            <a:extLst>
-              <a:ext uri="{FF2B5EF4-FFF2-40B4-BE49-F238E27FC236}">
-                <a16:creationId xmlns:a16="http://schemas.microsoft.com/office/drawing/2014/main" id="{06C1581A-9002-594D-F22C-4C9C9FD7B434}"/>
-              </a:ext>
-            </a:extLst>
-          </p:cNvPr>
-          <p:cNvSpPr/>
-          <p:nvPr/>
-        </p:nvSpPr>
-        <p:spPr>
-          <a:xfrm>
-            <a:off x="7109205" y="1023961"/>
-            <a:ext cx="2715314" cy="2057400"/>
-          </a:xfrm>
-          <a:prstGeom prst="roundRect">
-            <a:avLst>
-              <a:gd name="adj" fmla="val 5556"/>
-            </a:avLst>
-          </a:prstGeom>
-          <a:ln>
-            <a:noFill/>
-          </a:ln>
-          <a:effectLst>
-            <a:outerShdw blurRad="50800" dist="38100" dir="2700000" algn="tl" rotWithShape="0">
-              <a:prstClr val="black">
-                <a:alpha val="40000"/>
-              </a:prstClr>
-            </a:outerShdw>
-          </a:effectLst>
-        </p:spPr>
-        <p:style>
-          <a:lnRef idx="2">
-            <a:schemeClr val="accent6"/>
-          </a:lnRef>
-          <a:fillRef idx="1">
-            <a:schemeClr val="lt1"/>
-          </a:fillRef>
-          <a:effectRef idx="0">
-            <a:schemeClr val="accent6"/>
-          </a:effectRef>
-          <a:fontRef idx="minor">
-            <a:schemeClr val="dk1"/>
-          </a:fontRef>
-        </p:style>
-        <p:txBody>
-          <a:bodyPr rtlCol="0" anchor="ctr"/>
-          <a:lstStyle/>
-          <a:p>
-            <a:pPr algn="ctr"/>
-            <a:endParaRPr lang="en-US"/>
-          </a:p>
-        </p:txBody>
-      </p:sp>
-      <p:sp>
-        <p:nvSpPr>
-          <p:cNvPr id="26" name="Rectangle: Rounded Corners 25">
-            <a:extLst>
-              <a:ext uri="{FF2B5EF4-FFF2-40B4-BE49-F238E27FC236}">
-                <a16:creationId xmlns:a16="http://schemas.microsoft.com/office/drawing/2014/main" id="{4AAACADE-C158-502E-D2E4-0369A7746C3A}"/>
-              </a:ext>
-            </a:extLst>
-          </p:cNvPr>
-          <p:cNvSpPr/>
-          <p:nvPr/>
-        </p:nvSpPr>
-        <p:spPr>
-          <a:xfrm>
-            <a:off x="10038626" y="1023961"/>
-            <a:ext cx="2715314" cy="2057400"/>
-          </a:xfrm>
-          <a:prstGeom prst="roundRect">
-            <a:avLst>
-              <a:gd name="adj" fmla="val 5556"/>
-            </a:avLst>
-          </a:prstGeom>
-          <a:ln>
-            <a:noFill/>
-          </a:ln>
-          <a:effectLst>
-            <a:outerShdw blurRad="50800" dist="38100" dir="2700000" algn="tl" rotWithShape="0">
-              <a:prstClr val="black">
-                <a:alpha val="40000"/>
-              </a:prstClr>
-            </a:outerShdw>
-          </a:effectLst>
-        </p:spPr>
-        <p:style>
-          <a:lnRef idx="2">
-            <a:schemeClr val="accent6"/>
-          </a:lnRef>
-          <a:fillRef idx="1">
-            <a:schemeClr val="lt1"/>
-          </a:fillRef>
-          <a:effectRef idx="0">
-            <a:schemeClr val="accent6"/>
-          </a:effectRef>
-          <a:fontRef idx="minor">
-            <a:schemeClr val="dk1"/>
-          </a:fontRef>
-        </p:style>
-        <p:txBody>
-          <a:bodyPr rtlCol="0" anchor="ctr"/>
-          <a:lstStyle/>
-          <a:p>
-            <a:pPr algn="ctr"/>
-            <a:endParaRPr lang="en-US"/>
-          </a:p>
-        </p:txBody>
-      </p:sp>
-      <p:sp>
-        <p:nvSpPr>
-          <p:cNvPr id="27" name="Rectangle: Rounded Corners 26">
-            <a:extLst>
-              <a:ext uri="{FF2B5EF4-FFF2-40B4-BE49-F238E27FC236}">
-                <a16:creationId xmlns:a16="http://schemas.microsoft.com/office/drawing/2014/main" id="{5760F608-3977-5003-F84E-2C2C62B09A88}"/>
-              </a:ext>
-            </a:extLst>
-          </p:cNvPr>
-          <p:cNvSpPr/>
-          <p:nvPr/>
-        </p:nvSpPr>
-        <p:spPr>
-          <a:xfrm>
-            <a:off x="353605" y="3103014"/>
-            <a:ext cx="14447520" cy="142875"/>
+            <a:off x="798984" y="8772525"/>
+            <a:ext cx="14904720" cy="142875"/>
           </a:xfrm>
           <a:prstGeom prst="roundRect">
             <a:avLst>
@@ -6553,154 +6235,10 @@
           </a:p>
         </p:txBody>
       </p:sp>
-      <p:sp>
-        <p:nvSpPr>
-          <p:cNvPr id="28" name="Rectangle: Rounded Corners 27">
-            <a:extLst>
-              <a:ext uri="{FF2B5EF4-FFF2-40B4-BE49-F238E27FC236}">
-                <a16:creationId xmlns:a16="http://schemas.microsoft.com/office/drawing/2014/main" id="{45EEB59A-C1DF-293A-1329-AE8C0E48429E}"/>
-              </a:ext>
-            </a:extLst>
-          </p:cNvPr>
-          <p:cNvSpPr/>
-          <p:nvPr/>
-        </p:nvSpPr>
-        <p:spPr>
-          <a:xfrm>
-            <a:off x="1087141" y="5635204"/>
-            <a:ext cx="14904720" cy="142875"/>
-          </a:xfrm>
-          <a:prstGeom prst="roundRect">
-            <a:avLst>
-              <a:gd name="adj" fmla="val 0"/>
-            </a:avLst>
-          </a:prstGeom>
-        </p:spPr>
-        <p:style>
-          <a:lnRef idx="2">
-            <a:schemeClr val="accent1">
-              <a:shade val="15000"/>
-            </a:schemeClr>
-          </a:lnRef>
-          <a:fillRef idx="1">
-            <a:schemeClr val="accent1"/>
-          </a:fillRef>
-          <a:effectRef idx="0">
-            <a:schemeClr val="accent1"/>
-          </a:effectRef>
-          <a:fontRef idx="minor">
-            <a:schemeClr val="lt1"/>
-          </a:fontRef>
-        </p:style>
-        <p:txBody>
-          <a:bodyPr rtlCol="0" anchor="ctr"/>
-          <a:lstStyle/>
-          <a:p>
-            <a:pPr algn="ctr"/>
-            <a:endParaRPr lang="en-US"/>
-          </a:p>
-        </p:txBody>
-      </p:sp>
-      <p:sp>
-        <p:nvSpPr>
-          <p:cNvPr id="30" name="Rectangle: Rounded Corners 29">
-            <a:extLst>
-              <a:ext uri="{FF2B5EF4-FFF2-40B4-BE49-F238E27FC236}">
-                <a16:creationId xmlns:a16="http://schemas.microsoft.com/office/drawing/2014/main" id="{BB5F90CF-C3B2-5A16-A6E5-E7079489391B}"/>
-              </a:ext>
-            </a:extLst>
-          </p:cNvPr>
-          <p:cNvSpPr/>
-          <p:nvPr/>
-        </p:nvSpPr>
-        <p:spPr>
-          <a:xfrm>
-            <a:off x="798984" y="8772525"/>
-            <a:ext cx="14904720" cy="142875"/>
-          </a:xfrm>
-          <a:prstGeom prst="roundRect">
-            <a:avLst>
-              <a:gd name="adj" fmla="val 0"/>
-            </a:avLst>
-          </a:prstGeom>
-        </p:spPr>
-        <p:style>
-          <a:lnRef idx="2">
-            <a:schemeClr val="accent1">
-              <a:shade val="15000"/>
-            </a:schemeClr>
-          </a:lnRef>
-          <a:fillRef idx="1">
-            <a:schemeClr val="accent1"/>
-          </a:fillRef>
-          <a:effectRef idx="0">
-            <a:schemeClr val="accent1"/>
-          </a:effectRef>
-          <a:fontRef idx="minor">
-            <a:schemeClr val="lt1"/>
-          </a:fontRef>
-        </p:style>
-        <p:txBody>
-          <a:bodyPr rtlCol="0" anchor="ctr"/>
-          <a:lstStyle/>
-          <a:p>
-            <a:pPr algn="ctr"/>
-            <a:endParaRPr lang="en-US"/>
-          </a:p>
-        </p:txBody>
-      </p:sp>
-      <p:sp>
-        <p:nvSpPr>
-          <p:cNvPr id="2" name="Rectangle: Rounded Corners 1">
-            <a:extLst>
-              <a:ext uri="{FF2B5EF4-FFF2-40B4-BE49-F238E27FC236}">
-                <a16:creationId xmlns:a16="http://schemas.microsoft.com/office/drawing/2014/main" id="{1FC7D3FE-6A1A-3D88-C588-B53D52CCBE31}"/>
-              </a:ext>
-            </a:extLst>
-          </p:cNvPr>
-          <p:cNvSpPr/>
-          <p:nvPr/>
-        </p:nvSpPr>
-        <p:spPr>
-          <a:xfrm>
-            <a:off x="-343155" y="6733877"/>
-            <a:ext cx="14904720" cy="142875"/>
-          </a:xfrm>
-          <a:prstGeom prst="roundRect">
-            <a:avLst>
-              <a:gd name="adj" fmla="val 0"/>
-            </a:avLst>
-          </a:prstGeom>
-        </p:spPr>
-        <p:style>
-          <a:lnRef idx="2">
-            <a:schemeClr val="accent1">
-              <a:shade val="15000"/>
-            </a:schemeClr>
-          </a:lnRef>
-          <a:fillRef idx="1">
-            <a:schemeClr val="accent1"/>
-          </a:fillRef>
-          <a:effectRef idx="0">
-            <a:schemeClr val="accent1"/>
-          </a:effectRef>
-          <a:fontRef idx="minor">
-            <a:schemeClr val="lt1"/>
-          </a:fontRef>
-        </p:style>
-        <p:txBody>
-          <a:bodyPr rtlCol="0" anchor="ctr"/>
-          <a:lstStyle/>
-          <a:p>
-            <a:pPr algn="ctr"/>
-            <a:endParaRPr lang="en-US"/>
-          </a:p>
-        </p:txBody>
-      </p:sp>
     </p:spTree>
     <p:extLst>
       <p:ext uri="{BB962C8B-B14F-4D97-AF65-F5344CB8AC3E}">
-        <p14:creationId xmlns:p14="http://schemas.microsoft.com/office/powerpoint/2010/main" val="4157508912"/>
+        <p14:creationId xmlns:p14="http://schemas.microsoft.com/office/powerpoint/2010/main" val="3728154160"/>
       </p:ext>
     </p:extLst>
   </p:cSld>

</xml_diff>

<commit_message>
Completed Customer and Logistics Analysis and Documented the analysis
</commit_message>
<xml_diff>
--- a/Dashboard Background Design/Dashboard Background Design.pptx
+++ b/Dashboard Background Design/Dashboard Background Design.pptx
@@ -9,6 +9,8 @@
     <p:sldId id="259" r:id="rId3"/>
     <p:sldId id="260" r:id="rId4"/>
     <p:sldId id="261" r:id="rId5"/>
+    <p:sldId id="263" r:id="rId6"/>
+    <p:sldId id="262" r:id="rId7"/>
   </p:sldIdLst>
   <p:sldSz cx="15849600" cy="8915400"/>
   <p:notesSz cx="6858000" cy="9144000"/>
@@ -246,7 +248,7 @@
           <a:p>
             <a:fld id="{3DD42230-267C-431A-8169-41D027ABCFB4}" type="datetimeFigureOut">
               <a:rPr lang="en-US" smtClean="0"/>
-              <a:t>11/23/2025</a:t>
+              <a:t>12/1/2025</a:t>
             </a:fld>
             <a:endParaRPr lang="en-US"/>
           </a:p>
@@ -416,7 +418,7 @@
           <a:p>
             <a:fld id="{3DD42230-267C-431A-8169-41D027ABCFB4}" type="datetimeFigureOut">
               <a:rPr lang="en-US" smtClean="0"/>
-              <a:t>11/23/2025</a:t>
+              <a:t>12/1/2025</a:t>
             </a:fld>
             <a:endParaRPr lang="en-US"/>
           </a:p>
@@ -596,7 +598,7 @@
           <a:p>
             <a:fld id="{3DD42230-267C-431A-8169-41D027ABCFB4}" type="datetimeFigureOut">
               <a:rPr lang="en-US" smtClean="0"/>
-              <a:t>11/23/2025</a:t>
+              <a:t>12/1/2025</a:t>
             </a:fld>
             <a:endParaRPr lang="en-US"/>
           </a:p>
@@ -766,7 +768,7 @@
           <a:p>
             <a:fld id="{3DD42230-267C-431A-8169-41D027ABCFB4}" type="datetimeFigureOut">
               <a:rPr lang="en-US" smtClean="0"/>
-              <a:t>11/23/2025</a:t>
+              <a:t>12/1/2025</a:t>
             </a:fld>
             <a:endParaRPr lang="en-US"/>
           </a:p>
@@ -1012,7 +1014,7 @@
           <a:p>
             <a:fld id="{3DD42230-267C-431A-8169-41D027ABCFB4}" type="datetimeFigureOut">
               <a:rPr lang="en-US" smtClean="0"/>
-              <a:t>11/23/2025</a:t>
+              <a:t>12/1/2025</a:t>
             </a:fld>
             <a:endParaRPr lang="en-US"/>
           </a:p>
@@ -1244,7 +1246,7 @@
           <a:p>
             <a:fld id="{3DD42230-267C-431A-8169-41D027ABCFB4}" type="datetimeFigureOut">
               <a:rPr lang="en-US" smtClean="0"/>
-              <a:t>11/23/2025</a:t>
+              <a:t>12/1/2025</a:t>
             </a:fld>
             <a:endParaRPr lang="en-US"/>
           </a:p>
@@ -1611,7 +1613,7 @@
           <a:p>
             <a:fld id="{3DD42230-267C-431A-8169-41D027ABCFB4}" type="datetimeFigureOut">
               <a:rPr lang="en-US" smtClean="0"/>
-              <a:t>11/23/2025</a:t>
+              <a:t>12/1/2025</a:t>
             </a:fld>
             <a:endParaRPr lang="en-US"/>
           </a:p>
@@ -1729,7 +1731,7 @@
           <a:p>
             <a:fld id="{3DD42230-267C-431A-8169-41D027ABCFB4}" type="datetimeFigureOut">
               <a:rPr lang="en-US" smtClean="0"/>
-              <a:t>11/23/2025</a:t>
+              <a:t>12/1/2025</a:t>
             </a:fld>
             <a:endParaRPr lang="en-US"/>
           </a:p>
@@ -1824,7 +1826,7 @@
           <a:p>
             <a:fld id="{3DD42230-267C-431A-8169-41D027ABCFB4}" type="datetimeFigureOut">
               <a:rPr lang="en-US" smtClean="0"/>
-              <a:t>11/23/2025</a:t>
+              <a:t>12/1/2025</a:t>
             </a:fld>
             <a:endParaRPr lang="en-US"/>
           </a:p>
@@ -2101,7 +2103,7 @@
           <a:p>
             <a:fld id="{3DD42230-267C-431A-8169-41D027ABCFB4}" type="datetimeFigureOut">
               <a:rPr lang="en-US" smtClean="0"/>
-              <a:t>11/23/2025</a:t>
+              <a:t>12/1/2025</a:t>
             </a:fld>
             <a:endParaRPr lang="en-US"/>
           </a:p>
@@ -2358,7 +2360,7 @@
           <a:p>
             <a:fld id="{3DD42230-267C-431A-8169-41D027ABCFB4}" type="datetimeFigureOut">
               <a:rPr lang="en-US" smtClean="0"/>
-              <a:t>11/23/2025</a:t>
+              <a:t>12/1/2025</a:t>
             </a:fld>
             <a:endParaRPr lang="en-US"/>
           </a:p>
@@ -2571,7 +2573,7 @@
           <a:p>
             <a:fld id="{3DD42230-267C-431A-8169-41D027ABCFB4}" type="datetimeFigureOut">
               <a:rPr lang="en-US" smtClean="0"/>
-              <a:t>11/23/2025</a:t>
+              <a:t>12/1/2025</a:t>
             </a:fld>
             <a:endParaRPr lang="en-US"/>
           </a:p>
@@ -3003,9 +3005,9 @@
           </a:ln>
           <a:effectLst>
             <a:outerShdw blurRad="50800" dist="38100" dir="2700000" algn="tl" rotWithShape="0">
-              <a:prstClr val="black">
+              <a:srgbClr val="4EA8DE">
                 <a:alpha val="40000"/>
-              </a:prstClr>
+              </a:srgbClr>
             </a:outerShdw>
           </a:effectLst>
         </p:spPr>
@@ -3059,9 +3061,9 @@
           </a:ln>
           <a:effectLst>
             <a:outerShdw blurRad="50800" dist="38100" dir="2700000" algn="tl" rotWithShape="0">
-              <a:prstClr val="black">
+              <a:srgbClr val="4EA8DE">
                 <a:alpha val="40000"/>
-              </a:prstClr>
+              </a:srgbClr>
             </a:outerShdw>
           </a:effectLst>
         </p:spPr>
@@ -3314,9 +3316,9 @@
           </a:ln>
           <a:effectLst>
             <a:outerShdw blurRad="50800" dist="38100" dir="2700000" algn="tl" rotWithShape="0">
-              <a:prstClr val="black">
+              <a:srgbClr val="4EA8DE">
                 <a:alpha val="40000"/>
-              </a:prstClr>
+              </a:srgbClr>
             </a:outerShdw>
           </a:effectLst>
         </p:spPr>
@@ -3370,9 +3372,9 @@
           </a:ln>
           <a:effectLst>
             <a:outerShdw blurRad="50800" dist="38100" dir="2700000" algn="tl" rotWithShape="0">
-              <a:prstClr val="black">
+              <a:srgbClr val="4EA8DE">
                 <a:alpha val="40000"/>
-              </a:prstClr>
+              </a:srgbClr>
             </a:outerShdw>
           </a:effectLst>
         </p:spPr>
@@ -3426,9 +3428,9 @@
           </a:ln>
           <a:effectLst>
             <a:outerShdw blurRad="50800" dist="38100" dir="2700000" algn="tl" rotWithShape="0">
-              <a:prstClr val="black">
+              <a:srgbClr val="4EA8DE">
                 <a:alpha val="40000"/>
-              </a:prstClr>
+              </a:srgbClr>
             </a:outerShdw>
           </a:effectLst>
         </p:spPr>
@@ -3482,9 +3484,9 @@
           </a:ln>
           <a:effectLst>
             <a:outerShdw blurRad="50800" dist="38100" dir="2700000" algn="tl" rotWithShape="0">
-              <a:prstClr val="black">
+              <a:srgbClr val="4EA8DE">
                 <a:alpha val="40000"/>
-              </a:prstClr>
+              </a:srgbClr>
             </a:outerShdw>
           </a:effectLst>
         </p:spPr>
@@ -3538,9 +3540,9 @@
           </a:ln>
           <a:effectLst>
             <a:outerShdw blurRad="50800" dist="38100" dir="2700000" algn="tl" rotWithShape="0">
-              <a:prstClr val="black">
+              <a:srgbClr val="4EA8DE">
                 <a:alpha val="40000"/>
-              </a:prstClr>
+              </a:srgbClr>
             </a:outerShdw>
           </a:effectLst>
         </p:spPr>
@@ -3693,246 +3695,6 @@
           </a:fontRef>
         </p:style>
       </p:cxnSp>
-      <p:sp>
-        <p:nvSpPr>
-          <p:cNvPr id="2" name="Rectangle: Rounded Corners 1">
-            <a:extLst>
-              <a:ext uri="{FF2B5EF4-FFF2-40B4-BE49-F238E27FC236}">
-                <a16:creationId xmlns:a16="http://schemas.microsoft.com/office/drawing/2014/main" id="{A75F976E-D384-70C1-0C6C-BF7C8244CFF0}"/>
-              </a:ext>
-            </a:extLst>
-          </p:cNvPr>
-          <p:cNvSpPr/>
-          <p:nvPr/>
-        </p:nvSpPr>
-        <p:spPr>
-          <a:xfrm>
-            <a:off x="353605" y="2785968"/>
-            <a:ext cx="14447520" cy="142875"/>
-          </a:xfrm>
-          <a:prstGeom prst="roundRect">
-            <a:avLst>
-              <a:gd name="adj" fmla="val 0"/>
-            </a:avLst>
-          </a:prstGeom>
-        </p:spPr>
-        <p:style>
-          <a:lnRef idx="2">
-            <a:schemeClr val="accent1">
-              <a:shade val="15000"/>
-            </a:schemeClr>
-          </a:lnRef>
-          <a:fillRef idx="1">
-            <a:schemeClr val="accent1"/>
-          </a:fillRef>
-          <a:effectRef idx="0">
-            <a:schemeClr val="accent1"/>
-          </a:effectRef>
-          <a:fontRef idx="minor">
-            <a:schemeClr val="lt1"/>
-          </a:fontRef>
-        </p:style>
-        <p:txBody>
-          <a:bodyPr rtlCol="0" anchor="ctr"/>
-          <a:lstStyle/>
-          <a:p>
-            <a:pPr algn="ctr"/>
-            <a:endParaRPr lang="en-US"/>
-          </a:p>
-        </p:txBody>
-      </p:sp>
-      <p:sp>
-        <p:nvSpPr>
-          <p:cNvPr id="3" name="Rectangle: Rounded Corners 2">
-            <a:extLst>
-              <a:ext uri="{FF2B5EF4-FFF2-40B4-BE49-F238E27FC236}">
-                <a16:creationId xmlns:a16="http://schemas.microsoft.com/office/drawing/2014/main" id="{31F54860-7E34-96E9-B6CB-A4936D8DBF11}"/>
-              </a:ext>
-            </a:extLst>
-          </p:cNvPr>
-          <p:cNvSpPr/>
-          <p:nvPr/>
-        </p:nvSpPr>
-        <p:spPr>
-          <a:xfrm>
-            <a:off x="0" y="5738358"/>
-            <a:ext cx="14447520" cy="142875"/>
-          </a:xfrm>
-          <a:prstGeom prst="roundRect">
-            <a:avLst>
-              <a:gd name="adj" fmla="val 0"/>
-            </a:avLst>
-          </a:prstGeom>
-        </p:spPr>
-        <p:style>
-          <a:lnRef idx="2">
-            <a:schemeClr val="accent1">
-              <a:shade val="15000"/>
-            </a:schemeClr>
-          </a:lnRef>
-          <a:fillRef idx="1">
-            <a:schemeClr val="accent1"/>
-          </a:fillRef>
-          <a:effectRef idx="0">
-            <a:schemeClr val="accent1"/>
-          </a:effectRef>
-          <a:fontRef idx="minor">
-            <a:schemeClr val="lt1"/>
-          </a:fontRef>
-        </p:style>
-        <p:txBody>
-          <a:bodyPr rtlCol="0" anchor="ctr"/>
-          <a:lstStyle/>
-          <a:p>
-            <a:pPr algn="ctr"/>
-            <a:endParaRPr lang="en-US"/>
-          </a:p>
-        </p:txBody>
-      </p:sp>
-      <p:sp>
-        <p:nvSpPr>
-          <p:cNvPr id="4" name="Rectangle: Rounded Corners 3">
-            <a:extLst>
-              <a:ext uri="{FF2B5EF4-FFF2-40B4-BE49-F238E27FC236}">
-                <a16:creationId xmlns:a16="http://schemas.microsoft.com/office/drawing/2014/main" id="{DFACFA55-1A64-14E3-E051-F53E435F7BDE}"/>
-              </a:ext>
-            </a:extLst>
-          </p:cNvPr>
-          <p:cNvSpPr/>
-          <p:nvPr/>
-        </p:nvSpPr>
-        <p:spPr>
-          <a:xfrm rot="16200000">
-            <a:off x="-2113844" y="3661763"/>
-            <a:ext cx="6521697" cy="142875"/>
-          </a:xfrm>
-          <a:prstGeom prst="roundRect">
-            <a:avLst>
-              <a:gd name="adj" fmla="val 0"/>
-            </a:avLst>
-          </a:prstGeom>
-        </p:spPr>
-        <p:style>
-          <a:lnRef idx="2">
-            <a:schemeClr val="accent1">
-              <a:shade val="15000"/>
-            </a:schemeClr>
-          </a:lnRef>
-          <a:fillRef idx="1">
-            <a:schemeClr val="accent1"/>
-          </a:fillRef>
-          <a:effectRef idx="0">
-            <a:schemeClr val="accent1"/>
-          </a:effectRef>
-          <a:fontRef idx="minor">
-            <a:schemeClr val="lt1"/>
-          </a:fontRef>
-        </p:style>
-        <p:txBody>
-          <a:bodyPr rtlCol="0" anchor="ctr"/>
-          <a:lstStyle/>
-          <a:p>
-            <a:pPr algn="ctr"/>
-            <a:endParaRPr lang="en-US"/>
-          </a:p>
-        </p:txBody>
-      </p:sp>
-      <p:sp>
-        <p:nvSpPr>
-          <p:cNvPr id="5" name="Rectangle: Rounded Corners 4">
-            <a:extLst>
-              <a:ext uri="{FF2B5EF4-FFF2-40B4-BE49-F238E27FC236}">
-                <a16:creationId xmlns:a16="http://schemas.microsoft.com/office/drawing/2014/main" id="{28732C9E-BEB8-D958-B509-5D8541275EE5}"/>
-              </a:ext>
-            </a:extLst>
-          </p:cNvPr>
-          <p:cNvSpPr/>
-          <p:nvPr/>
-        </p:nvSpPr>
-        <p:spPr>
-          <a:xfrm rot="16200000">
-            <a:off x="12482147" y="4092564"/>
-            <a:ext cx="6521697" cy="142875"/>
-          </a:xfrm>
-          <a:prstGeom prst="roundRect">
-            <a:avLst>
-              <a:gd name="adj" fmla="val 0"/>
-            </a:avLst>
-          </a:prstGeom>
-        </p:spPr>
-        <p:style>
-          <a:lnRef idx="2">
-            <a:schemeClr val="accent1">
-              <a:shade val="15000"/>
-            </a:schemeClr>
-          </a:lnRef>
-          <a:fillRef idx="1">
-            <a:schemeClr val="accent1"/>
-          </a:fillRef>
-          <a:effectRef idx="0">
-            <a:schemeClr val="accent1"/>
-          </a:effectRef>
-          <a:fontRef idx="minor">
-            <a:schemeClr val="lt1"/>
-          </a:fontRef>
-        </p:style>
-        <p:txBody>
-          <a:bodyPr rtlCol="0" anchor="ctr"/>
-          <a:lstStyle/>
-          <a:p>
-            <a:pPr algn="ctr"/>
-            <a:endParaRPr lang="en-US"/>
-          </a:p>
-        </p:txBody>
-      </p:sp>
-      <p:sp>
-        <p:nvSpPr>
-          <p:cNvPr id="6" name="Rectangle: Rounded Corners 5">
-            <a:extLst>
-              <a:ext uri="{FF2B5EF4-FFF2-40B4-BE49-F238E27FC236}">
-                <a16:creationId xmlns:a16="http://schemas.microsoft.com/office/drawing/2014/main" id="{C4D3EE70-ABF9-5D79-3730-DE7B0547F3F1}"/>
-              </a:ext>
-            </a:extLst>
-          </p:cNvPr>
-          <p:cNvSpPr/>
-          <p:nvPr/>
-        </p:nvSpPr>
-        <p:spPr>
-          <a:xfrm>
-            <a:off x="798984" y="8772525"/>
-            <a:ext cx="14904720" cy="142875"/>
-          </a:xfrm>
-          <a:prstGeom prst="roundRect">
-            <a:avLst>
-              <a:gd name="adj" fmla="val 0"/>
-            </a:avLst>
-          </a:prstGeom>
-        </p:spPr>
-        <p:style>
-          <a:lnRef idx="2">
-            <a:schemeClr val="accent1">
-              <a:shade val="15000"/>
-            </a:schemeClr>
-          </a:lnRef>
-          <a:fillRef idx="1">
-            <a:schemeClr val="accent1"/>
-          </a:fillRef>
-          <a:effectRef idx="0">
-            <a:schemeClr val="accent1"/>
-          </a:effectRef>
-          <a:fontRef idx="minor">
-            <a:schemeClr val="lt1"/>
-          </a:fontRef>
-        </p:style>
-        <p:txBody>
-          <a:bodyPr rtlCol="0" anchor="ctr"/>
-          <a:lstStyle/>
-          <a:p>
-            <a:pPr algn="ctr"/>
-            <a:endParaRPr lang="en-US"/>
-          </a:p>
-        </p:txBody>
-      </p:sp>
     </p:spTree>
     <p:extLst>
       <p:ext uri="{BB962C8B-B14F-4D97-AF65-F5344CB8AC3E}">
@@ -3996,9 +3758,9 @@
           </a:ln>
           <a:effectLst>
             <a:outerShdw blurRad="50800" dist="38100" dir="2700000" algn="tl" rotWithShape="0">
-              <a:prstClr val="black">
+              <a:srgbClr val="4EA8DE">
                 <a:alpha val="40000"/>
-              </a:prstClr>
+              </a:srgbClr>
             </a:outerShdw>
           </a:effectLst>
         </p:spPr>
@@ -4052,9 +3814,9 @@
           </a:ln>
           <a:effectLst>
             <a:outerShdw blurRad="50800" dist="38100" dir="2700000" algn="tl" rotWithShape="0">
-              <a:prstClr val="black">
+              <a:srgbClr val="4EA8DE">
                 <a:alpha val="40000"/>
-              </a:prstClr>
+              </a:srgbClr>
             </a:outerShdw>
           </a:effectLst>
         </p:spPr>
@@ -4309,9 +4071,9 @@
           </a:ln>
           <a:effectLst>
             <a:outerShdw blurRad="50800" dist="38100" dir="2700000" algn="tl" rotWithShape="0">
-              <a:prstClr val="black">
+              <a:srgbClr val="4EA8DE">
                 <a:alpha val="40000"/>
-              </a:prstClr>
+              </a:srgbClr>
             </a:outerShdw>
           </a:effectLst>
         </p:spPr>
@@ -4365,9 +4127,9 @@
           </a:ln>
           <a:effectLst>
             <a:outerShdw blurRad="50800" dist="38100" dir="2700000" algn="tl" rotWithShape="0">
-              <a:prstClr val="black">
+              <a:srgbClr val="4EA8DE">
                 <a:alpha val="40000"/>
-              </a:prstClr>
+              </a:srgbClr>
             </a:outerShdw>
           </a:effectLst>
         </p:spPr>
@@ -4421,9 +4183,9 @@
           </a:ln>
           <a:effectLst>
             <a:outerShdw blurRad="50800" dist="38100" dir="2700000" algn="tl" rotWithShape="0">
-              <a:prstClr val="black">
+              <a:srgbClr val="4EA8DE">
                 <a:alpha val="40000"/>
-              </a:prstClr>
+              </a:srgbClr>
             </a:outerShdw>
           </a:effectLst>
         </p:spPr>
@@ -4477,9 +4239,9 @@
           </a:ln>
           <a:effectLst>
             <a:outerShdw blurRad="50800" dist="38100" dir="2700000" algn="tl" rotWithShape="0">
-              <a:prstClr val="black">
+              <a:srgbClr val="4EA8DE">
                 <a:alpha val="40000"/>
-              </a:prstClr>
+              </a:srgbClr>
             </a:outerShdw>
           </a:effectLst>
         </p:spPr>
@@ -4533,9 +4295,9 @@
           </a:ln>
           <a:effectLst>
             <a:outerShdw blurRad="50800" dist="38100" dir="2700000" algn="tl" rotWithShape="0">
-              <a:prstClr val="black">
+              <a:srgbClr val="4EA8DE">
                 <a:alpha val="40000"/>
-              </a:prstClr>
+              </a:srgbClr>
             </a:outerShdw>
           </a:effectLst>
         </p:spPr>
@@ -4750,9 +4512,9 @@
           </a:ln>
           <a:effectLst>
             <a:outerShdw blurRad="50800" dist="38100" dir="2700000" algn="tl" rotWithShape="0">
-              <a:prstClr val="black">
+              <a:srgbClr val="4EA8DE">
                 <a:alpha val="40000"/>
-              </a:prstClr>
+              </a:srgbClr>
             </a:outerShdw>
           </a:effectLst>
         </p:spPr>
@@ -4806,9 +4568,9 @@
           </a:ln>
           <a:effectLst>
             <a:outerShdw blurRad="50800" dist="38100" dir="2700000" algn="tl" rotWithShape="0">
-              <a:prstClr val="black">
+              <a:srgbClr val="4EA8DE">
                 <a:alpha val="40000"/>
-              </a:prstClr>
+              </a:srgbClr>
             </a:outerShdw>
           </a:effectLst>
         </p:spPr>
@@ -5032,7 +4794,7 @@
       </p:sp>
       <p:pic>
         <p:nvPicPr>
-          <p:cNvPr id="37" name="Picture 36" descr="A blue squares on a black background&#10;&#10;AI-generated content may be incorrect.">
+          <p:cNvPr id="37" name="Picture 36">
             <a:extLst>
               <a:ext uri="{FF2B5EF4-FFF2-40B4-BE49-F238E27FC236}">
                 <a16:creationId xmlns:a16="http://schemas.microsoft.com/office/drawing/2014/main" id="{B18B6DD8-4A16-2D70-1D7B-C331A937B109}"/>
@@ -5052,9 +4814,8 @@
               </a:ext>
             </a:extLst>
           </a:blip>
-          <a:stretch>
-            <a:fillRect/>
-          </a:stretch>
+          <a:srcRect/>
+          <a:stretch/>
         </p:blipFill>
         <p:spPr>
           <a:xfrm>
@@ -5292,8 +5053,8 @@
         </p:nvSpPr>
         <p:spPr>
           <a:xfrm>
-            <a:off x="1203693" y="5935180"/>
-            <a:ext cx="14441539" cy="2822177"/>
+            <a:off x="1203693" y="5594324"/>
+            <a:ext cx="14441539" cy="3163034"/>
           </a:xfrm>
           <a:prstGeom prst="roundRect">
             <a:avLst>
@@ -5305,9 +5066,9 @@
           </a:ln>
           <a:effectLst>
             <a:outerShdw blurRad="50800" dist="38100" dir="2700000" algn="tl" rotWithShape="0">
-              <a:prstClr val="black">
+              <a:srgbClr val="4EA8DE">
                 <a:alpha val="40000"/>
-              </a:prstClr>
+              </a:srgbClr>
             </a:outerShdw>
           </a:effectLst>
         </p:spPr>
@@ -5348,8 +5109,8 @@
         </p:nvSpPr>
         <p:spPr>
           <a:xfrm>
-            <a:off x="1224037" y="2980220"/>
-            <a:ext cx="14421195" cy="2778849"/>
+            <a:off x="1224037" y="2451843"/>
+            <a:ext cx="14421195" cy="2939577"/>
           </a:xfrm>
           <a:prstGeom prst="roundRect">
             <a:avLst>
@@ -5361,9 +5122,9 @@
           </a:ln>
           <a:effectLst>
             <a:outerShdw blurRad="50800" dist="38100" dir="2700000" algn="tl" rotWithShape="0">
-              <a:prstClr val="black">
+              <a:srgbClr val="4EA8DE">
                 <a:alpha val="40000"/>
-              </a:prstClr>
+              </a:srgbClr>
             </a:outerShdw>
           </a:effectLst>
         </p:spPr>
@@ -5557,7 +5318,7 @@
         <p:spPr>
           <a:xfrm>
             <a:off x="1203693" y="179965"/>
-            <a:ext cx="3083170" cy="584775"/>
+            <a:ext cx="4798522" cy="584775"/>
           </a:xfrm>
           <a:prstGeom prst="rect">
             <a:avLst/>
@@ -5579,7 +5340,7 @@
                 <a:ea typeface="Open Sans" pitchFamily="2" charset="0"/>
                 <a:cs typeface="Open Sans" pitchFamily="2" charset="0"/>
               </a:rPr>
-              <a:t>Overview</a:t>
+              <a:t>Customer Performance</a:t>
             </a:r>
             <a:endParaRPr lang="en-US" dirty="0">
               <a:latin typeface="Open Sans" pitchFamily="2" charset="0"/>
@@ -5604,7 +5365,7 @@
         <p:spPr>
           <a:xfrm>
             <a:off x="1250363" y="952218"/>
-            <a:ext cx="2715314" cy="1828800"/>
+            <a:ext cx="2715314" cy="1310336"/>
           </a:xfrm>
           <a:prstGeom prst="roundRect">
             <a:avLst>
@@ -5616,9 +5377,9 @@
           </a:ln>
           <a:effectLst>
             <a:outerShdw blurRad="50800" dist="38100" dir="2700000" algn="tl" rotWithShape="0">
-              <a:prstClr val="black">
+              <a:srgbClr val="4EA8DE">
                 <a:alpha val="40000"/>
-              </a:prstClr>
+              </a:srgbClr>
             </a:outerShdw>
           </a:effectLst>
         </p:spPr>
@@ -5660,7 +5421,7 @@
         <p:spPr>
           <a:xfrm>
             <a:off x="12968045" y="952218"/>
-            <a:ext cx="2715314" cy="1828800"/>
+            <a:ext cx="2715314" cy="1310336"/>
           </a:xfrm>
           <a:prstGeom prst="roundRect">
             <a:avLst>
@@ -5672,9 +5433,9 @@
           </a:ln>
           <a:effectLst>
             <a:outerShdw blurRad="50800" dist="38100" dir="2700000" algn="tl" rotWithShape="0">
-              <a:prstClr val="black">
+              <a:srgbClr val="4EA8DE">
                 <a:alpha val="40000"/>
-              </a:prstClr>
+              </a:srgbClr>
             </a:outerShdw>
           </a:effectLst>
         </p:spPr>
@@ -5716,7 +5477,7 @@
         <p:spPr>
           <a:xfrm>
             <a:off x="4179784" y="952218"/>
-            <a:ext cx="2715314" cy="1828800"/>
+            <a:ext cx="2715314" cy="1310336"/>
           </a:xfrm>
           <a:prstGeom prst="roundRect">
             <a:avLst>
@@ -5728,9 +5489,9 @@
           </a:ln>
           <a:effectLst>
             <a:outerShdw blurRad="50800" dist="38100" dir="2700000" algn="tl" rotWithShape="0">
-              <a:prstClr val="black">
+              <a:srgbClr val="4EA8DE">
                 <a:alpha val="40000"/>
-              </a:prstClr>
+              </a:srgbClr>
             </a:outerShdw>
           </a:effectLst>
         </p:spPr>
@@ -5772,7 +5533,7 @@
         <p:spPr>
           <a:xfrm>
             <a:off x="7109205" y="952218"/>
-            <a:ext cx="2715314" cy="1828800"/>
+            <a:ext cx="2715314" cy="1310336"/>
           </a:xfrm>
           <a:prstGeom prst="roundRect">
             <a:avLst>
@@ -5784,9 +5545,9 @@
           </a:ln>
           <a:effectLst>
             <a:outerShdw blurRad="50800" dist="38100" dir="2700000" algn="tl" rotWithShape="0">
-              <a:prstClr val="black">
+              <a:srgbClr val="4EA8DE">
                 <a:alpha val="40000"/>
-              </a:prstClr>
+              </a:srgbClr>
             </a:outerShdw>
           </a:effectLst>
         </p:spPr>
@@ -5828,7 +5589,7 @@
         <p:spPr>
           <a:xfrm>
             <a:off x="10038626" y="952218"/>
-            <a:ext cx="2715314" cy="1828800"/>
+            <a:ext cx="2715314" cy="1310336"/>
           </a:xfrm>
           <a:prstGeom prst="roundRect">
             <a:avLst>
@@ -5840,9 +5601,9 @@
           </a:ln>
           <a:effectLst>
             <a:outerShdw blurRad="50800" dist="38100" dir="2700000" algn="tl" rotWithShape="0">
-              <a:prstClr val="black">
+              <a:srgbClr val="4EA8DE">
                 <a:alpha val="40000"/>
-              </a:prstClr>
+              </a:srgbClr>
             </a:outerShdw>
           </a:effectLst>
         </p:spPr>
@@ -5871,7 +5632,7 @@
       </p:sp>
       <p:pic>
         <p:nvPicPr>
-          <p:cNvPr id="37" name="Picture 36" descr="A blue squares on a black background&#10;&#10;AI-generated content may be incorrect.">
+          <p:cNvPr id="37" name="Picture 36">
             <a:extLst>
               <a:ext uri="{FF2B5EF4-FFF2-40B4-BE49-F238E27FC236}">
                 <a16:creationId xmlns:a16="http://schemas.microsoft.com/office/drawing/2014/main" id="{71BD89FB-B091-3A2A-D400-AEF82458BAA1}"/>
@@ -5891,9 +5652,8 @@
               </a:ext>
             </a:extLst>
           </a:blip>
-          <a:stretch>
-            <a:fillRect/>
-          </a:stretch>
+          <a:srcRect/>
+          <a:stretch/>
         </p:blipFill>
         <p:spPr>
           <a:xfrm>
@@ -5921,8 +5681,8 @@
         </p:nvCxnSpPr>
         <p:spPr>
           <a:xfrm>
-            <a:off x="9824519" y="3082974"/>
-            <a:ext cx="0" cy="2573340"/>
+            <a:off x="8434634" y="2595751"/>
+            <a:ext cx="0" cy="2651760"/>
           </a:xfrm>
           <a:prstGeom prst="line">
             <a:avLst/>
@@ -5966,8 +5726,8 @@
         </p:nvCxnSpPr>
         <p:spPr>
           <a:xfrm>
-            <a:off x="9827259" y="6036632"/>
-            <a:ext cx="0" cy="2619273"/>
+            <a:off x="8424462" y="5804241"/>
+            <a:ext cx="0" cy="2743200"/>
           </a:xfrm>
           <a:prstGeom prst="line">
             <a:avLst/>
@@ -5995,12 +5755,48 @@
           </a:fontRef>
         </p:style>
       </p:cxnSp>
-      <p:sp>
-        <p:nvSpPr>
-          <p:cNvPr id="2" name="Rectangle: Rounded Corners 1">
-            <a:extLst>
-              <a:ext uri="{FF2B5EF4-FFF2-40B4-BE49-F238E27FC236}">
-                <a16:creationId xmlns:a16="http://schemas.microsoft.com/office/drawing/2014/main" id="{E6EA0952-BF0D-B25E-2289-E9DC2D8A4672}"/>
+    </p:spTree>
+    <p:extLst>
+      <p:ext uri="{BB962C8B-B14F-4D97-AF65-F5344CB8AC3E}">
+        <p14:creationId xmlns:p14="http://schemas.microsoft.com/office/powerpoint/2010/main" val="3728154160"/>
+      </p:ext>
+    </p:extLst>
+  </p:cSld>
+  <p:clrMapOvr>
+    <a:masterClrMapping/>
+  </p:clrMapOvr>
+</p:sld>
+</file>
+
+<file path=ppt/slides/slide5.xml><?xml version="1.0" encoding="utf-8"?>
+<p:sld xmlns:a="http://schemas.openxmlformats.org/drawingml/2006/main" xmlns:r="http://schemas.openxmlformats.org/officeDocument/2006/relationships" xmlns:p="http://schemas.openxmlformats.org/presentationml/2006/main">
+  <p:cSld>
+    <p:spTree>
+      <p:nvGrpSpPr>
+        <p:cNvPr id="1" name="">
+          <a:extLst>
+            <a:ext uri="{FF2B5EF4-FFF2-40B4-BE49-F238E27FC236}">
+              <a16:creationId xmlns:a16="http://schemas.microsoft.com/office/drawing/2014/main" id="{0BDE88A1-C40D-53AF-F917-FC42879A99C6}"/>
+            </a:ext>
+          </a:extLst>
+        </p:cNvPr>
+        <p:cNvGrpSpPr/>
+        <p:nvPr/>
+      </p:nvGrpSpPr>
+      <p:grpSpPr>
+        <a:xfrm>
+          <a:off x="0" y="0"/>
+          <a:ext cx="0" cy="0"/>
+          <a:chOff x="0" y="0"/>
+          <a:chExt cx="0" cy="0"/>
+        </a:xfrm>
+      </p:grpSpPr>
+      <p:sp>
+        <p:nvSpPr>
+          <p:cNvPr id="31" name="Rectangle: Rounded Corners 30">
+            <a:extLst>
+              <a:ext uri="{FF2B5EF4-FFF2-40B4-BE49-F238E27FC236}">
+                <a16:creationId xmlns:a16="http://schemas.microsoft.com/office/drawing/2014/main" id="{EAAF8270-75B0-A688-7033-289E7F57EE66}"/>
               </a:ext>
             </a:extLst>
           </p:cNvPr>
@@ -6009,14 +5805,230 @@
         </p:nvSpPr>
         <p:spPr>
           <a:xfrm>
-            <a:off x="353605" y="2785968"/>
-            <a:ext cx="14447520" cy="142875"/>
+            <a:off x="1203693" y="5821074"/>
+            <a:ext cx="14441539" cy="3050390"/>
           </a:xfrm>
           <a:prstGeom prst="roundRect">
             <a:avLst>
-              <a:gd name="adj" fmla="val 0"/>
+              <a:gd name="adj" fmla="val 2376"/>
             </a:avLst>
           </a:prstGeom>
+          <a:ln>
+            <a:noFill/>
+          </a:ln>
+          <a:effectLst>
+            <a:outerShdw blurRad="50800" dist="38100" dir="2700000" algn="tl" rotWithShape="0">
+              <a:srgbClr val="4EA8DE">
+                <a:alpha val="40000"/>
+              </a:srgbClr>
+            </a:outerShdw>
+          </a:effectLst>
+        </p:spPr>
+        <p:style>
+          <a:lnRef idx="2">
+            <a:schemeClr val="accent6"/>
+          </a:lnRef>
+          <a:fillRef idx="1">
+            <a:schemeClr val="lt1"/>
+          </a:fillRef>
+          <a:effectRef idx="0">
+            <a:schemeClr val="accent6"/>
+          </a:effectRef>
+          <a:fontRef idx="minor">
+            <a:schemeClr val="dk1"/>
+          </a:fontRef>
+        </p:style>
+        <p:txBody>
+          <a:bodyPr rtlCol="0" anchor="ctr"/>
+          <a:lstStyle/>
+          <a:p>
+            <a:pPr algn="ctr"/>
+            <a:endParaRPr lang="en-US"/>
+          </a:p>
+        </p:txBody>
+      </p:sp>
+      <p:sp>
+        <p:nvSpPr>
+          <p:cNvPr id="32" name="Rectangle: Rounded Corners 31">
+            <a:extLst>
+              <a:ext uri="{FF2B5EF4-FFF2-40B4-BE49-F238E27FC236}">
+                <a16:creationId xmlns:a16="http://schemas.microsoft.com/office/drawing/2014/main" id="{E22C220B-57A6-0A5C-352E-B99F2FC37A49}"/>
+              </a:ext>
+            </a:extLst>
+          </p:cNvPr>
+          <p:cNvSpPr/>
+          <p:nvPr/>
+        </p:nvSpPr>
+        <p:spPr>
+          <a:xfrm>
+            <a:off x="1224037" y="2871932"/>
+            <a:ext cx="14421195" cy="2778849"/>
+          </a:xfrm>
+          <a:prstGeom prst="roundRect">
+            <a:avLst>
+              <a:gd name="adj" fmla="val 2376"/>
+            </a:avLst>
+          </a:prstGeom>
+          <a:ln>
+            <a:noFill/>
+          </a:ln>
+          <a:effectLst>
+            <a:outerShdw blurRad="50800" dist="38100" dir="2700000" algn="tl" rotWithShape="0">
+              <a:srgbClr val="4EA8DE">
+                <a:alpha val="40000"/>
+              </a:srgbClr>
+            </a:outerShdw>
+          </a:effectLst>
+        </p:spPr>
+        <p:style>
+          <a:lnRef idx="2">
+            <a:schemeClr val="accent6"/>
+          </a:lnRef>
+          <a:fillRef idx="1">
+            <a:schemeClr val="lt1"/>
+          </a:fillRef>
+          <a:effectRef idx="0">
+            <a:schemeClr val="accent6"/>
+          </a:effectRef>
+          <a:fontRef idx="minor">
+            <a:schemeClr val="dk1"/>
+          </a:fontRef>
+        </p:style>
+        <p:txBody>
+          <a:bodyPr rtlCol="0" anchor="ctr"/>
+          <a:lstStyle/>
+          <a:p>
+            <a:pPr algn="ctr"/>
+            <a:endParaRPr lang="en-US"/>
+          </a:p>
+        </p:txBody>
+      </p:sp>
+      <p:cxnSp>
+        <p:nvCxnSpPr>
+          <p:cNvPr id="9" name="Straight Connector 8">
+            <a:extLst>
+              <a:ext uri="{FF2B5EF4-FFF2-40B4-BE49-F238E27FC236}">
+                <a16:creationId xmlns:a16="http://schemas.microsoft.com/office/drawing/2014/main" id="{E2736A80-3674-4FFA-C6B6-8150DEF29B09}"/>
+              </a:ext>
+            </a:extLst>
+          </p:cNvPr>
+          <p:cNvCxnSpPr/>
+          <p:nvPr/>
+        </p:nvCxnSpPr>
+        <p:spPr>
+          <a:xfrm>
+            <a:off x="1277815" y="37850"/>
+            <a:ext cx="0" cy="640080"/>
+          </a:xfrm>
+          <a:prstGeom prst="line">
+            <a:avLst/>
+          </a:prstGeom>
+          <a:ln w="47625">
+            <a:solidFill>
+              <a:schemeClr val="bg1"/>
+            </a:solidFill>
+          </a:ln>
+        </p:spPr>
+        <p:style>
+          <a:lnRef idx="2">
+            <a:schemeClr val="accent1"/>
+          </a:lnRef>
+          <a:fillRef idx="0">
+            <a:schemeClr val="accent1"/>
+          </a:fillRef>
+          <a:effectRef idx="1">
+            <a:schemeClr val="accent1"/>
+          </a:effectRef>
+          <a:fontRef idx="minor">
+            <a:schemeClr val="tx1"/>
+          </a:fontRef>
+        </p:style>
+      </p:cxnSp>
+      <p:sp>
+        <p:nvSpPr>
+          <p:cNvPr id="10" name="TextBox 9">
+            <a:extLst>
+              <a:ext uri="{FF2B5EF4-FFF2-40B4-BE49-F238E27FC236}">
+                <a16:creationId xmlns:a16="http://schemas.microsoft.com/office/drawing/2014/main" id="{0AC94B3B-F6CE-CEDA-5622-B8A085FCC775}"/>
+              </a:ext>
+            </a:extLst>
+          </p:cNvPr>
+          <p:cNvSpPr txBox="1"/>
+          <p:nvPr/>
+        </p:nvSpPr>
+        <p:spPr>
+          <a:xfrm>
+            <a:off x="1453661" y="82060"/>
+            <a:ext cx="2684584" cy="523220"/>
+          </a:xfrm>
+          <a:prstGeom prst="rect">
+            <a:avLst/>
+          </a:prstGeom>
+          <a:noFill/>
+        </p:spPr>
+        <p:txBody>
+          <a:bodyPr wrap="square" rtlCol="0">
+            <a:spAutoFit/>
+          </a:bodyPr>
+          <a:lstStyle/>
+          <a:p>
+            <a:r>
+              <a:rPr lang="en-US" sz="2800" dirty="0">
+                <a:solidFill>
+                  <a:schemeClr val="bg1"/>
+                </a:solidFill>
+                <a:latin typeface="Open Sans" pitchFamily="2" charset="0"/>
+                <a:ea typeface="Open Sans" pitchFamily="2" charset="0"/>
+                <a:cs typeface="Open Sans" pitchFamily="2" charset="0"/>
+              </a:rPr>
+              <a:t>Overview</a:t>
+            </a:r>
+            <a:endParaRPr lang="en-US" dirty="0">
+              <a:solidFill>
+                <a:schemeClr val="bg1"/>
+              </a:solidFill>
+              <a:latin typeface="Open Sans" pitchFamily="2" charset="0"/>
+              <a:ea typeface="Open Sans" pitchFamily="2" charset="0"/>
+              <a:cs typeface="Open Sans" pitchFamily="2" charset="0"/>
+            </a:endParaRPr>
+          </a:p>
+        </p:txBody>
+      </p:sp>
+      <p:sp>
+        <p:nvSpPr>
+          <p:cNvPr id="12" name="Rectangle: Rounded Corners 11">
+            <a:extLst>
+              <a:ext uri="{FF2B5EF4-FFF2-40B4-BE49-F238E27FC236}">
+                <a16:creationId xmlns:a16="http://schemas.microsoft.com/office/drawing/2014/main" id="{550F66F1-51A4-09E9-0C8A-A2886C904E0D}"/>
+              </a:ext>
+            </a:extLst>
+          </p:cNvPr>
+          <p:cNvSpPr/>
+          <p:nvPr/>
+        </p:nvSpPr>
+        <p:spPr>
+          <a:xfrm>
+            <a:off x="35167" y="952218"/>
+            <a:ext cx="1031630" cy="7805140"/>
+          </a:xfrm>
+          <a:prstGeom prst="roundRect">
+            <a:avLst/>
+          </a:prstGeom>
+          <a:solidFill>
+            <a:srgbClr val="4EA8DE">
+              <a:alpha val="65000"/>
+            </a:srgbClr>
+          </a:solidFill>
+          <a:ln>
+            <a:noFill/>
+          </a:ln>
+          <a:effectLst>
+            <a:outerShdw blurRad="50800" dist="38100" dir="5400000" algn="t" rotWithShape="0">
+              <a:prstClr val="black">
+                <a:alpha val="40000"/>
+              </a:prstClr>
+            </a:outerShdw>
+          </a:effectLst>
         </p:spPr>
         <p:style>
           <a:lnRef idx="2">
@@ -6045,10 +6057,57 @@
       </p:sp>
       <p:sp>
         <p:nvSpPr>
-          <p:cNvPr id="3" name="Rectangle: Rounded Corners 2">
-            <a:extLst>
-              <a:ext uri="{FF2B5EF4-FFF2-40B4-BE49-F238E27FC236}">
-                <a16:creationId xmlns:a16="http://schemas.microsoft.com/office/drawing/2014/main" id="{24EAE022-CCB3-847D-DD41-E68F660B441B}"/>
+          <p:cNvPr id="11" name="TextBox 10">
+            <a:extLst>
+              <a:ext uri="{FF2B5EF4-FFF2-40B4-BE49-F238E27FC236}">
+                <a16:creationId xmlns:a16="http://schemas.microsoft.com/office/drawing/2014/main" id="{004B9A25-61D1-E1A2-3A01-06801A34004E}"/>
+              </a:ext>
+            </a:extLst>
+          </p:cNvPr>
+          <p:cNvSpPr txBox="1"/>
+          <p:nvPr/>
+        </p:nvSpPr>
+        <p:spPr>
+          <a:xfrm>
+            <a:off x="1203692" y="179965"/>
+            <a:ext cx="6171665" cy="584775"/>
+          </a:xfrm>
+          <a:prstGeom prst="rect">
+            <a:avLst/>
+          </a:prstGeom>
+          <a:noFill/>
+          <a:ln>
+            <a:noFill/>
+          </a:ln>
+        </p:spPr>
+        <p:txBody>
+          <a:bodyPr wrap="square" rtlCol="0">
+            <a:spAutoFit/>
+          </a:bodyPr>
+          <a:lstStyle/>
+          <a:p>
+            <a:r>
+              <a:rPr lang="en-US" sz="3200" dirty="0">
+                <a:latin typeface="Open Sans" pitchFamily="2" charset="0"/>
+                <a:ea typeface="Open Sans" pitchFamily="2" charset="0"/>
+                <a:cs typeface="Open Sans" pitchFamily="2" charset="0"/>
+              </a:rPr>
+              <a:t>Logistics Performance</a:t>
+            </a:r>
+            <a:endParaRPr lang="en-US" dirty="0">
+              <a:latin typeface="Open Sans" pitchFamily="2" charset="0"/>
+              <a:ea typeface="Open Sans" pitchFamily="2" charset="0"/>
+              <a:cs typeface="Open Sans" pitchFamily="2" charset="0"/>
+            </a:endParaRPr>
+          </a:p>
+        </p:txBody>
+      </p:sp>
+      <p:sp>
+        <p:nvSpPr>
+          <p:cNvPr id="14" name="Rectangle: Rounded Corners 13">
+            <a:extLst>
+              <a:ext uri="{FF2B5EF4-FFF2-40B4-BE49-F238E27FC236}">
+                <a16:creationId xmlns:a16="http://schemas.microsoft.com/office/drawing/2014/main" id="{21AC2F0D-2319-79CC-FA07-78C1D8951D2F}"/>
               </a:ext>
             </a:extLst>
           </p:cNvPr>
@@ -6057,14 +6116,671 @@
         </p:nvSpPr>
         <p:spPr>
           <a:xfrm>
-            <a:off x="0" y="5738358"/>
-            <a:ext cx="14447520" cy="142875"/>
+            <a:off x="1250363" y="952218"/>
+            <a:ext cx="2715314" cy="1737360"/>
           </a:xfrm>
           <a:prstGeom prst="roundRect">
             <a:avLst>
-              <a:gd name="adj" fmla="val 0"/>
+              <a:gd name="adj" fmla="val 5556"/>
             </a:avLst>
           </a:prstGeom>
+          <a:ln>
+            <a:noFill/>
+          </a:ln>
+          <a:effectLst>
+            <a:outerShdw blurRad="50800" dist="38100" dir="2700000" algn="tl" rotWithShape="0">
+              <a:srgbClr val="4EA8DE">
+                <a:alpha val="40000"/>
+              </a:srgbClr>
+            </a:outerShdw>
+          </a:effectLst>
+        </p:spPr>
+        <p:style>
+          <a:lnRef idx="2">
+            <a:schemeClr val="accent6"/>
+          </a:lnRef>
+          <a:fillRef idx="1">
+            <a:schemeClr val="lt1"/>
+          </a:fillRef>
+          <a:effectRef idx="0">
+            <a:schemeClr val="accent6"/>
+          </a:effectRef>
+          <a:fontRef idx="minor">
+            <a:schemeClr val="dk1"/>
+          </a:fontRef>
+        </p:style>
+        <p:txBody>
+          <a:bodyPr rtlCol="0" anchor="ctr"/>
+          <a:lstStyle/>
+          <a:p>
+            <a:pPr algn="ctr"/>
+            <a:endParaRPr lang="en-US"/>
+          </a:p>
+        </p:txBody>
+      </p:sp>
+      <p:sp>
+        <p:nvSpPr>
+          <p:cNvPr id="23" name="Rectangle: Rounded Corners 22">
+            <a:extLst>
+              <a:ext uri="{FF2B5EF4-FFF2-40B4-BE49-F238E27FC236}">
+                <a16:creationId xmlns:a16="http://schemas.microsoft.com/office/drawing/2014/main" id="{9E9AEF56-EA7C-79C4-9BB1-0D2951D65CAA}"/>
+              </a:ext>
+            </a:extLst>
+          </p:cNvPr>
+          <p:cNvSpPr/>
+          <p:nvPr/>
+        </p:nvSpPr>
+        <p:spPr>
+          <a:xfrm>
+            <a:off x="12968045" y="952218"/>
+            <a:ext cx="2715314" cy="1737360"/>
+          </a:xfrm>
+          <a:prstGeom prst="roundRect">
+            <a:avLst>
+              <a:gd name="adj" fmla="val 5556"/>
+            </a:avLst>
+          </a:prstGeom>
+          <a:ln>
+            <a:noFill/>
+          </a:ln>
+          <a:effectLst>
+            <a:outerShdw blurRad="50800" dist="38100" dir="2700000" algn="tl" rotWithShape="0">
+              <a:srgbClr val="4EA8DE">
+                <a:alpha val="40000"/>
+              </a:srgbClr>
+            </a:outerShdw>
+          </a:effectLst>
+        </p:spPr>
+        <p:style>
+          <a:lnRef idx="2">
+            <a:schemeClr val="accent6"/>
+          </a:lnRef>
+          <a:fillRef idx="1">
+            <a:schemeClr val="lt1"/>
+          </a:fillRef>
+          <a:effectRef idx="0">
+            <a:schemeClr val="accent6"/>
+          </a:effectRef>
+          <a:fontRef idx="minor">
+            <a:schemeClr val="dk1"/>
+          </a:fontRef>
+        </p:style>
+        <p:txBody>
+          <a:bodyPr rtlCol="0" anchor="ctr"/>
+          <a:lstStyle/>
+          <a:p>
+            <a:pPr algn="ctr"/>
+            <a:endParaRPr lang="en-US"/>
+          </a:p>
+        </p:txBody>
+      </p:sp>
+      <p:sp>
+        <p:nvSpPr>
+          <p:cNvPr id="24" name="Rectangle: Rounded Corners 23">
+            <a:extLst>
+              <a:ext uri="{FF2B5EF4-FFF2-40B4-BE49-F238E27FC236}">
+                <a16:creationId xmlns:a16="http://schemas.microsoft.com/office/drawing/2014/main" id="{FB83CBF6-D025-DB03-5D07-E7C4AEB1F1AA}"/>
+              </a:ext>
+            </a:extLst>
+          </p:cNvPr>
+          <p:cNvSpPr/>
+          <p:nvPr/>
+        </p:nvSpPr>
+        <p:spPr>
+          <a:xfrm>
+            <a:off x="4179784" y="952218"/>
+            <a:ext cx="2715314" cy="1737360"/>
+          </a:xfrm>
+          <a:prstGeom prst="roundRect">
+            <a:avLst>
+              <a:gd name="adj" fmla="val 5556"/>
+            </a:avLst>
+          </a:prstGeom>
+          <a:ln>
+            <a:noFill/>
+          </a:ln>
+          <a:effectLst>
+            <a:outerShdw blurRad="50800" dist="38100" dir="2700000" algn="tl" rotWithShape="0">
+              <a:srgbClr val="4EA8DE">
+                <a:alpha val="40000"/>
+              </a:srgbClr>
+            </a:outerShdw>
+          </a:effectLst>
+        </p:spPr>
+        <p:style>
+          <a:lnRef idx="2">
+            <a:schemeClr val="accent6"/>
+          </a:lnRef>
+          <a:fillRef idx="1">
+            <a:schemeClr val="lt1"/>
+          </a:fillRef>
+          <a:effectRef idx="0">
+            <a:schemeClr val="accent6"/>
+          </a:effectRef>
+          <a:fontRef idx="minor">
+            <a:schemeClr val="dk1"/>
+          </a:fontRef>
+        </p:style>
+        <p:txBody>
+          <a:bodyPr rtlCol="0" anchor="ctr"/>
+          <a:lstStyle/>
+          <a:p>
+            <a:pPr algn="ctr"/>
+            <a:endParaRPr lang="en-US"/>
+          </a:p>
+        </p:txBody>
+      </p:sp>
+      <p:sp>
+        <p:nvSpPr>
+          <p:cNvPr id="25" name="Rectangle: Rounded Corners 24">
+            <a:extLst>
+              <a:ext uri="{FF2B5EF4-FFF2-40B4-BE49-F238E27FC236}">
+                <a16:creationId xmlns:a16="http://schemas.microsoft.com/office/drawing/2014/main" id="{99D572D1-513B-CA66-8CAA-E62EF8F3CCD9}"/>
+              </a:ext>
+            </a:extLst>
+          </p:cNvPr>
+          <p:cNvSpPr/>
+          <p:nvPr/>
+        </p:nvSpPr>
+        <p:spPr>
+          <a:xfrm>
+            <a:off x="7109205" y="952218"/>
+            <a:ext cx="2715314" cy="1737360"/>
+          </a:xfrm>
+          <a:prstGeom prst="roundRect">
+            <a:avLst>
+              <a:gd name="adj" fmla="val 5556"/>
+            </a:avLst>
+          </a:prstGeom>
+          <a:ln>
+            <a:noFill/>
+          </a:ln>
+          <a:effectLst>
+            <a:outerShdw blurRad="50800" dist="38100" dir="2700000" algn="tl" rotWithShape="0">
+              <a:srgbClr val="4EA8DE">
+                <a:alpha val="40000"/>
+              </a:srgbClr>
+            </a:outerShdw>
+          </a:effectLst>
+        </p:spPr>
+        <p:style>
+          <a:lnRef idx="2">
+            <a:schemeClr val="accent6"/>
+          </a:lnRef>
+          <a:fillRef idx="1">
+            <a:schemeClr val="lt1"/>
+          </a:fillRef>
+          <a:effectRef idx="0">
+            <a:schemeClr val="accent6"/>
+          </a:effectRef>
+          <a:fontRef idx="minor">
+            <a:schemeClr val="dk1"/>
+          </a:fontRef>
+        </p:style>
+        <p:txBody>
+          <a:bodyPr rtlCol="0" anchor="ctr"/>
+          <a:lstStyle/>
+          <a:p>
+            <a:pPr algn="ctr"/>
+            <a:endParaRPr lang="en-US"/>
+          </a:p>
+        </p:txBody>
+      </p:sp>
+      <p:sp>
+        <p:nvSpPr>
+          <p:cNvPr id="26" name="Rectangle: Rounded Corners 25">
+            <a:extLst>
+              <a:ext uri="{FF2B5EF4-FFF2-40B4-BE49-F238E27FC236}">
+                <a16:creationId xmlns:a16="http://schemas.microsoft.com/office/drawing/2014/main" id="{BE1BABE1-08B3-308D-A26F-8D2D7AA5A0E8}"/>
+              </a:ext>
+            </a:extLst>
+          </p:cNvPr>
+          <p:cNvSpPr/>
+          <p:nvPr/>
+        </p:nvSpPr>
+        <p:spPr>
+          <a:xfrm>
+            <a:off x="10038626" y="952218"/>
+            <a:ext cx="2715314" cy="1737360"/>
+          </a:xfrm>
+          <a:prstGeom prst="roundRect">
+            <a:avLst>
+              <a:gd name="adj" fmla="val 5556"/>
+            </a:avLst>
+          </a:prstGeom>
+          <a:ln>
+            <a:noFill/>
+          </a:ln>
+          <a:effectLst>
+            <a:outerShdw blurRad="50800" dist="38100" dir="2700000" algn="tl" rotWithShape="0">
+              <a:srgbClr val="4EA8DE">
+                <a:alpha val="40000"/>
+              </a:srgbClr>
+            </a:outerShdw>
+          </a:effectLst>
+        </p:spPr>
+        <p:style>
+          <a:lnRef idx="2">
+            <a:schemeClr val="accent6"/>
+          </a:lnRef>
+          <a:fillRef idx="1">
+            <a:schemeClr val="lt1"/>
+          </a:fillRef>
+          <a:effectRef idx="0">
+            <a:schemeClr val="accent6"/>
+          </a:effectRef>
+          <a:fontRef idx="minor">
+            <a:schemeClr val="dk1"/>
+          </a:fontRef>
+        </p:style>
+        <p:txBody>
+          <a:bodyPr rtlCol="0" anchor="ctr"/>
+          <a:lstStyle/>
+          <a:p>
+            <a:pPr algn="ctr"/>
+            <a:endParaRPr lang="en-US"/>
+          </a:p>
+        </p:txBody>
+      </p:sp>
+      <p:pic>
+        <p:nvPicPr>
+          <p:cNvPr id="37" name="Picture 36">
+            <a:extLst>
+              <a:ext uri="{FF2B5EF4-FFF2-40B4-BE49-F238E27FC236}">
+                <a16:creationId xmlns:a16="http://schemas.microsoft.com/office/drawing/2014/main" id="{2AF2AE7C-AF5D-1BBD-D974-554886CABB29}"/>
+              </a:ext>
+            </a:extLst>
+          </p:cNvPr>
+          <p:cNvPicPr>
+            <a:picLocks noChangeAspect="1"/>
+          </p:cNvPicPr>
+          <p:nvPr/>
+        </p:nvPicPr>
+        <p:blipFill>
+          <a:blip r:embed="rId2">
+            <a:extLst>
+              <a:ext uri="{28A0092B-C50C-407E-A947-70E740481C1C}">
+                <a14:useLocalDpi xmlns:a14="http://schemas.microsoft.com/office/drawing/2010/main" val="0"/>
+              </a:ext>
+            </a:extLst>
+          </a:blip>
+          <a:srcRect/>
+          <a:stretch/>
+        </p:blipFill>
+        <p:spPr>
+          <a:xfrm>
+            <a:off x="120181" y="41551"/>
+            <a:ext cx="861602" cy="861602"/>
+          </a:xfrm>
+          <a:prstGeom prst="rect">
+            <a:avLst/>
+          </a:prstGeom>
+        </p:spPr>
+      </p:pic>
+      <p:cxnSp>
+        <p:nvCxnSpPr>
+          <p:cNvPr id="39" name="Straight Connector 38">
+            <a:extLst>
+              <a:ext uri="{FF2B5EF4-FFF2-40B4-BE49-F238E27FC236}">
+                <a16:creationId xmlns:a16="http://schemas.microsoft.com/office/drawing/2014/main" id="{94519FBD-416C-A8A8-F66F-5C84E0623BD6}"/>
+              </a:ext>
+            </a:extLst>
+          </p:cNvPr>
+          <p:cNvCxnSpPr>
+            <a:cxnSpLocks/>
+          </p:cNvCxnSpPr>
+          <p:nvPr/>
+        </p:nvCxnSpPr>
+        <p:spPr>
+          <a:xfrm>
+            <a:off x="8434634" y="2974686"/>
+            <a:ext cx="0" cy="2573340"/>
+          </a:xfrm>
+          <a:prstGeom prst="line">
+            <a:avLst/>
+          </a:prstGeom>
+          <a:ln>
+            <a:solidFill>
+              <a:srgbClr val="4EA8DE">
+                <a:alpha val="65000"/>
+              </a:srgbClr>
+            </a:solidFill>
+          </a:ln>
+        </p:spPr>
+        <p:style>
+          <a:lnRef idx="2">
+            <a:schemeClr val="accent1"/>
+          </a:lnRef>
+          <a:fillRef idx="0">
+            <a:schemeClr val="accent1"/>
+          </a:fillRef>
+          <a:effectRef idx="1">
+            <a:schemeClr val="accent1"/>
+          </a:effectRef>
+          <a:fontRef idx="minor">
+            <a:schemeClr val="tx1"/>
+          </a:fontRef>
+        </p:style>
+      </p:cxnSp>
+      <p:cxnSp>
+        <p:nvCxnSpPr>
+          <p:cNvPr id="40" name="Straight Connector 39">
+            <a:extLst>
+              <a:ext uri="{FF2B5EF4-FFF2-40B4-BE49-F238E27FC236}">
+                <a16:creationId xmlns:a16="http://schemas.microsoft.com/office/drawing/2014/main" id="{C70177FC-7CDC-C10F-ABAF-22446E56F109}"/>
+              </a:ext>
+            </a:extLst>
+          </p:cNvPr>
+          <p:cNvCxnSpPr>
+            <a:cxnSpLocks/>
+          </p:cNvCxnSpPr>
+          <p:nvPr/>
+        </p:nvCxnSpPr>
+        <p:spPr>
+          <a:xfrm>
+            <a:off x="8424462" y="6020389"/>
+            <a:ext cx="0" cy="2651760"/>
+          </a:xfrm>
+          <a:prstGeom prst="line">
+            <a:avLst/>
+          </a:prstGeom>
+          <a:ln>
+            <a:solidFill>
+              <a:srgbClr val="4EA8DE">
+                <a:alpha val="65000"/>
+              </a:srgbClr>
+            </a:solidFill>
+          </a:ln>
+        </p:spPr>
+        <p:style>
+          <a:lnRef idx="2">
+            <a:schemeClr val="accent1"/>
+          </a:lnRef>
+          <a:fillRef idx="0">
+            <a:schemeClr val="accent1"/>
+          </a:fillRef>
+          <a:effectRef idx="1">
+            <a:schemeClr val="accent1"/>
+          </a:effectRef>
+          <a:fontRef idx="minor">
+            <a:schemeClr val="tx1"/>
+          </a:fontRef>
+        </p:style>
+      </p:cxnSp>
+    </p:spTree>
+    <p:extLst>
+      <p:ext uri="{BB962C8B-B14F-4D97-AF65-F5344CB8AC3E}">
+        <p14:creationId xmlns:p14="http://schemas.microsoft.com/office/powerpoint/2010/main" val="2760028293"/>
+      </p:ext>
+    </p:extLst>
+  </p:cSld>
+  <p:clrMapOvr>
+    <a:masterClrMapping/>
+  </p:clrMapOvr>
+</p:sld>
+</file>
+
+<file path=ppt/slides/slide6.xml><?xml version="1.0" encoding="utf-8"?>
+<p:sld xmlns:a="http://schemas.openxmlformats.org/drawingml/2006/main" xmlns:r="http://schemas.openxmlformats.org/officeDocument/2006/relationships" xmlns:p="http://schemas.openxmlformats.org/presentationml/2006/main">
+  <p:cSld>
+    <p:spTree>
+      <p:nvGrpSpPr>
+        <p:cNvPr id="1" name="">
+          <a:extLst>
+            <a:ext uri="{FF2B5EF4-FFF2-40B4-BE49-F238E27FC236}">
+              <a16:creationId xmlns:a16="http://schemas.microsoft.com/office/drawing/2014/main" id="{D56F1ED8-0C1E-2FCD-96A6-987FE596E88F}"/>
+            </a:ext>
+          </a:extLst>
+        </p:cNvPr>
+        <p:cNvGrpSpPr/>
+        <p:nvPr/>
+      </p:nvGrpSpPr>
+      <p:grpSpPr>
+        <a:xfrm>
+          <a:off x="0" y="0"/>
+          <a:ext cx="0" cy="0"/>
+          <a:chOff x="0" y="0"/>
+          <a:chExt cx="0" cy="0"/>
+        </a:xfrm>
+      </p:grpSpPr>
+      <p:sp>
+        <p:nvSpPr>
+          <p:cNvPr id="31" name="Rectangle: Rounded Corners 30">
+            <a:extLst>
+              <a:ext uri="{FF2B5EF4-FFF2-40B4-BE49-F238E27FC236}">
+                <a16:creationId xmlns:a16="http://schemas.microsoft.com/office/drawing/2014/main" id="{98064621-0346-96C7-DC53-2BEFACD878EF}"/>
+              </a:ext>
+            </a:extLst>
+          </p:cNvPr>
+          <p:cNvSpPr/>
+          <p:nvPr/>
+        </p:nvSpPr>
+        <p:spPr>
+          <a:xfrm>
+            <a:off x="1203693" y="5935180"/>
+            <a:ext cx="14441539" cy="2822177"/>
+          </a:xfrm>
+          <a:prstGeom prst="roundRect">
+            <a:avLst>
+              <a:gd name="adj" fmla="val 2376"/>
+            </a:avLst>
+          </a:prstGeom>
+          <a:ln>
+            <a:noFill/>
+          </a:ln>
+          <a:effectLst>
+            <a:outerShdw blurRad="50800" dist="38100" dir="2700000" algn="tl" rotWithShape="0">
+              <a:prstClr val="black">
+                <a:alpha val="40000"/>
+              </a:prstClr>
+            </a:outerShdw>
+          </a:effectLst>
+        </p:spPr>
+        <p:style>
+          <a:lnRef idx="2">
+            <a:schemeClr val="accent6"/>
+          </a:lnRef>
+          <a:fillRef idx="1">
+            <a:schemeClr val="lt1"/>
+          </a:fillRef>
+          <a:effectRef idx="0">
+            <a:schemeClr val="accent6"/>
+          </a:effectRef>
+          <a:fontRef idx="minor">
+            <a:schemeClr val="dk1"/>
+          </a:fontRef>
+        </p:style>
+        <p:txBody>
+          <a:bodyPr rtlCol="0" anchor="ctr"/>
+          <a:lstStyle/>
+          <a:p>
+            <a:pPr algn="ctr"/>
+            <a:endParaRPr lang="en-US"/>
+          </a:p>
+        </p:txBody>
+      </p:sp>
+      <p:sp>
+        <p:nvSpPr>
+          <p:cNvPr id="32" name="Rectangle: Rounded Corners 31">
+            <a:extLst>
+              <a:ext uri="{FF2B5EF4-FFF2-40B4-BE49-F238E27FC236}">
+                <a16:creationId xmlns:a16="http://schemas.microsoft.com/office/drawing/2014/main" id="{40F4F8E0-220B-58CA-B2A0-3A594D343F15}"/>
+              </a:ext>
+            </a:extLst>
+          </p:cNvPr>
+          <p:cNvSpPr/>
+          <p:nvPr/>
+        </p:nvSpPr>
+        <p:spPr>
+          <a:xfrm>
+            <a:off x="1224037" y="2980220"/>
+            <a:ext cx="14421195" cy="2778849"/>
+          </a:xfrm>
+          <a:prstGeom prst="roundRect">
+            <a:avLst>
+              <a:gd name="adj" fmla="val 2376"/>
+            </a:avLst>
+          </a:prstGeom>
+          <a:ln>
+            <a:noFill/>
+          </a:ln>
+          <a:effectLst>
+            <a:outerShdw blurRad="50800" dist="38100" dir="2700000" algn="tl" rotWithShape="0">
+              <a:prstClr val="black">
+                <a:alpha val="40000"/>
+              </a:prstClr>
+            </a:outerShdw>
+          </a:effectLst>
+        </p:spPr>
+        <p:style>
+          <a:lnRef idx="2">
+            <a:schemeClr val="accent6"/>
+          </a:lnRef>
+          <a:fillRef idx="1">
+            <a:schemeClr val="lt1"/>
+          </a:fillRef>
+          <a:effectRef idx="0">
+            <a:schemeClr val="accent6"/>
+          </a:effectRef>
+          <a:fontRef idx="minor">
+            <a:schemeClr val="dk1"/>
+          </a:fontRef>
+        </p:style>
+        <p:txBody>
+          <a:bodyPr rtlCol="0" anchor="ctr"/>
+          <a:lstStyle/>
+          <a:p>
+            <a:pPr algn="ctr"/>
+            <a:endParaRPr lang="en-US"/>
+          </a:p>
+        </p:txBody>
+      </p:sp>
+      <p:cxnSp>
+        <p:nvCxnSpPr>
+          <p:cNvPr id="9" name="Straight Connector 8">
+            <a:extLst>
+              <a:ext uri="{FF2B5EF4-FFF2-40B4-BE49-F238E27FC236}">
+                <a16:creationId xmlns:a16="http://schemas.microsoft.com/office/drawing/2014/main" id="{837219A1-2536-D247-4901-7DF9B8E1C110}"/>
+              </a:ext>
+            </a:extLst>
+          </p:cNvPr>
+          <p:cNvCxnSpPr/>
+          <p:nvPr/>
+        </p:nvCxnSpPr>
+        <p:spPr>
+          <a:xfrm>
+            <a:off x="1277815" y="37850"/>
+            <a:ext cx="0" cy="640080"/>
+          </a:xfrm>
+          <a:prstGeom prst="line">
+            <a:avLst/>
+          </a:prstGeom>
+          <a:ln w="47625">
+            <a:solidFill>
+              <a:schemeClr val="bg1"/>
+            </a:solidFill>
+          </a:ln>
+        </p:spPr>
+        <p:style>
+          <a:lnRef idx="2">
+            <a:schemeClr val="accent1"/>
+          </a:lnRef>
+          <a:fillRef idx="0">
+            <a:schemeClr val="accent1"/>
+          </a:fillRef>
+          <a:effectRef idx="1">
+            <a:schemeClr val="accent1"/>
+          </a:effectRef>
+          <a:fontRef idx="minor">
+            <a:schemeClr val="tx1"/>
+          </a:fontRef>
+        </p:style>
+      </p:cxnSp>
+      <p:sp>
+        <p:nvSpPr>
+          <p:cNvPr id="10" name="TextBox 9">
+            <a:extLst>
+              <a:ext uri="{FF2B5EF4-FFF2-40B4-BE49-F238E27FC236}">
+                <a16:creationId xmlns:a16="http://schemas.microsoft.com/office/drawing/2014/main" id="{667285CF-5201-18B2-C213-1FE040C9779D}"/>
+              </a:ext>
+            </a:extLst>
+          </p:cNvPr>
+          <p:cNvSpPr txBox="1"/>
+          <p:nvPr/>
+        </p:nvSpPr>
+        <p:spPr>
+          <a:xfrm>
+            <a:off x="1453661" y="82060"/>
+            <a:ext cx="2684584" cy="523220"/>
+          </a:xfrm>
+          <a:prstGeom prst="rect">
+            <a:avLst/>
+          </a:prstGeom>
+          <a:noFill/>
+        </p:spPr>
+        <p:txBody>
+          <a:bodyPr wrap="square" rtlCol="0">
+            <a:spAutoFit/>
+          </a:bodyPr>
+          <a:lstStyle/>
+          <a:p>
+            <a:r>
+              <a:rPr lang="en-US" sz="2800" dirty="0">
+                <a:solidFill>
+                  <a:schemeClr val="bg1"/>
+                </a:solidFill>
+                <a:latin typeface="Open Sans" pitchFamily="2" charset="0"/>
+                <a:ea typeface="Open Sans" pitchFamily="2" charset="0"/>
+                <a:cs typeface="Open Sans" pitchFamily="2" charset="0"/>
+              </a:rPr>
+              <a:t>Overview</a:t>
+            </a:r>
+            <a:endParaRPr lang="en-US" dirty="0">
+              <a:solidFill>
+                <a:schemeClr val="bg1"/>
+              </a:solidFill>
+              <a:latin typeface="Open Sans" pitchFamily="2" charset="0"/>
+              <a:ea typeface="Open Sans" pitchFamily="2" charset="0"/>
+              <a:cs typeface="Open Sans" pitchFamily="2" charset="0"/>
+            </a:endParaRPr>
+          </a:p>
+        </p:txBody>
+      </p:sp>
+      <p:sp>
+        <p:nvSpPr>
+          <p:cNvPr id="12" name="Rectangle: Rounded Corners 11">
+            <a:extLst>
+              <a:ext uri="{FF2B5EF4-FFF2-40B4-BE49-F238E27FC236}">
+                <a16:creationId xmlns:a16="http://schemas.microsoft.com/office/drawing/2014/main" id="{D9B0A339-D7CE-778A-78D1-09195312FFE2}"/>
+              </a:ext>
+            </a:extLst>
+          </p:cNvPr>
+          <p:cNvSpPr/>
+          <p:nvPr/>
+        </p:nvSpPr>
+        <p:spPr>
+          <a:xfrm>
+            <a:off x="35167" y="952218"/>
+            <a:ext cx="1031630" cy="7805140"/>
+          </a:xfrm>
+          <a:prstGeom prst="roundRect">
+            <a:avLst/>
+          </a:prstGeom>
+          <a:solidFill>
+            <a:srgbClr val="4EA8DE">
+              <a:alpha val="65000"/>
+            </a:srgbClr>
+          </a:solidFill>
+          <a:ln>
+            <a:noFill/>
+          </a:ln>
+          <a:effectLst>
+            <a:outerShdw blurRad="50800" dist="38100" dir="5400000" algn="t" rotWithShape="0">
+              <a:prstClr val="black">
+                <a:alpha val="40000"/>
+              </a:prstClr>
+            </a:outerShdw>
+          </a:effectLst>
         </p:spPr>
         <p:style>
           <a:lnRef idx="2">
@@ -6093,10 +6809,57 @@
       </p:sp>
       <p:sp>
         <p:nvSpPr>
-          <p:cNvPr id="4" name="Rectangle: Rounded Corners 3">
-            <a:extLst>
-              <a:ext uri="{FF2B5EF4-FFF2-40B4-BE49-F238E27FC236}">
-                <a16:creationId xmlns:a16="http://schemas.microsoft.com/office/drawing/2014/main" id="{B0412BE8-3C4A-C6FD-7ADB-A71208285203}"/>
+          <p:cNvPr id="11" name="TextBox 10">
+            <a:extLst>
+              <a:ext uri="{FF2B5EF4-FFF2-40B4-BE49-F238E27FC236}">
+                <a16:creationId xmlns:a16="http://schemas.microsoft.com/office/drawing/2014/main" id="{CEFC4D21-7B68-866D-5FCD-2950D7BAA784}"/>
+              </a:ext>
+            </a:extLst>
+          </p:cNvPr>
+          <p:cNvSpPr txBox="1"/>
+          <p:nvPr/>
+        </p:nvSpPr>
+        <p:spPr>
+          <a:xfrm>
+            <a:off x="1203693" y="179965"/>
+            <a:ext cx="3083170" cy="584775"/>
+          </a:xfrm>
+          <a:prstGeom prst="rect">
+            <a:avLst/>
+          </a:prstGeom>
+          <a:noFill/>
+          <a:ln>
+            <a:noFill/>
+          </a:ln>
+        </p:spPr>
+        <p:txBody>
+          <a:bodyPr wrap="square" rtlCol="0">
+            <a:spAutoFit/>
+          </a:bodyPr>
+          <a:lstStyle/>
+          <a:p>
+            <a:r>
+              <a:rPr lang="en-US" sz="3200" dirty="0">
+                <a:latin typeface="Open Sans" pitchFamily="2" charset="0"/>
+                <a:ea typeface="Open Sans" pitchFamily="2" charset="0"/>
+                <a:cs typeface="Open Sans" pitchFamily="2" charset="0"/>
+              </a:rPr>
+              <a:t>Overview</a:t>
+            </a:r>
+            <a:endParaRPr lang="en-US" dirty="0">
+              <a:latin typeface="Open Sans" pitchFamily="2" charset="0"/>
+              <a:ea typeface="Open Sans" pitchFamily="2" charset="0"/>
+              <a:cs typeface="Open Sans" pitchFamily="2" charset="0"/>
+            </a:endParaRPr>
+          </a:p>
+        </p:txBody>
+      </p:sp>
+      <p:sp>
+        <p:nvSpPr>
+          <p:cNvPr id="14" name="Rectangle: Rounded Corners 13">
+            <a:extLst>
+              <a:ext uri="{FF2B5EF4-FFF2-40B4-BE49-F238E27FC236}">
+                <a16:creationId xmlns:a16="http://schemas.microsoft.com/office/drawing/2014/main" id="{2DD3F04F-DCB9-D8DD-86EB-E1B0B4567103}"/>
               </a:ext>
             </a:extLst>
           </p:cNvPr>
@@ -6104,9 +6867,415 @@
           <p:nvPr/>
         </p:nvSpPr>
         <p:spPr>
-          <a:xfrm rot="16200000">
-            <a:off x="-2113844" y="3661763"/>
-            <a:ext cx="6521697" cy="142875"/>
+          <a:xfrm>
+            <a:off x="1250363" y="952218"/>
+            <a:ext cx="2715314" cy="1828800"/>
+          </a:xfrm>
+          <a:prstGeom prst="roundRect">
+            <a:avLst>
+              <a:gd name="adj" fmla="val 5556"/>
+            </a:avLst>
+          </a:prstGeom>
+          <a:ln>
+            <a:noFill/>
+          </a:ln>
+          <a:effectLst>
+            <a:outerShdw blurRad="50800" dist="38100" dir="2700000" algn="tl" rotWithShape="0">
+              <a:prstClr val="black">
+                <a:alpha val="40000"/>
+              </a:prstClr>
+            </a:outerShdw>
+          </a:effectLst>
+        </p:spPr>
+        <p:style>
+          <a:lnRef idx="2">
+            <a:schemeClr val="accent6"/>
+          </a:lnRef>
+          <a:fillRef idx="1">
+            <a:schemeClr val="lt1"/>
+          </a:fillRef>
+          <a:effectRef idx="0">
+            <a:schemeClr val="accent6"/>
+          </a:effectRef>
+          <a:fontRef idx="minor">
+            <a:schemeClr val="dk1"/>
+          </a:fontRef>
+        </p:style>
+        <p:txBody>
+          <a:bodyPr rtlCol="0" anchor="ctr"/>
+          <a:lstStyle/>
+          <a:p>
+            <a:pPr algn="ctr"/>
+            <a:endParaRPr lang="en-US"/>
+          </a:p>
+        </p:txBody>
+      </p:sp>
+      <p:sp>
+        <p:nvSpPr>
+          <p:cNvPr id="23" name="Rectangle: Rounded Corners 22">
+            <a:extLst>
+              <a:ext uri="{FF2B5EF4-FFF2-40B4-BE49-F238E27FC236}">
+                <a16:creationId xmlns:a16="http://schemas.microsoft.com/office/drawing/2014/main" id="{347B7732-BC32-A391-7383-8154C1BCD56F}"/>
+              </a:ext>
+            </a:extLst>
+          </p:cNvPr>
+          <p:cNvSpPr/>
+          <p:nvPr/>
+        </p:nvSpPr>
+        <p:spPr>
+          <a:xfrm>
+            <a:off x="12968045" y="952218"/>
+            <a:ext cx="2715314" cy="1828800"/>
+          </a:xfrm>
+          <a:prstGeom prst="roundRect">
+            <a:avLst>
+              <a:gd name="adj" fmla="val 5556"/>
+            </a:avLst>
+          </a:prstGeom>
+          <a:ln>
+            <a:noFill/>
+          </a:ln>
+          <a:effectLst>
+            <a:outerShdw blurRad="50800" dist="38100" dir="2700000" algn="tl" rotWithShape="0">
+              <a:prstClr val="black">
+                <a:alpha val="40000"/>
+              </a:prstClr>
+            </a:outerShdw>
+          </a:effectLst>
+        </p:spPr>
+        <p:style>
+          <a:lnRef idx="2">
+            <a:schemeClr val="accent6"/>
+          </a:lnRef>
+          <a:fillRef idx="1">
+            <a:schemeClr val="lt1"/>
+          </a:fillRef>
+          <a:effectRef idx="0">
+            <a:schemeClr val="accent6"/>
+          </a:effectRef>
+          <a:fontRef idx="minor">
+            <a:schemeClr val="dk1"/>
+          </a:fontRef>
+        </p:style>
+        <p:txBody>
+          <a:bodyPr rtlCol="0" anchor="ctr"/>
+          <a:lstStyle/>
+          <a:p>
+            <a:pPr algn="ctr"/>
+            <a:endParaRPr lang="en-US"/>
+          </a:p>
+        </p:txBody>
+      </p:sp>
+      <p:sp>
+        <p:nvSpPr>
+          <p:cNvPr id="24" name="Rectangle: Rounded Corners 23">
+            <a:extLst>
+              <a:ext uri="{FF2B5EF4-FFF2-40B4-BE49-F238E27FC236}">
+                <a16:creationId xmlns:a16="http://schemas.microsoft.com/office/drawing/2014/main" id="{F3C1A896-1A30-9C46-8A77-3533656AE1FA}"/>
+              </a:ext>
+            </a:extLst>
+          </p:cNvPr>
+          <p:cNvSpPr/>
+          <p:nvPr/>
+        </p:nvSpPr>
+        <p:spPr>
+          <a:xfrm>
+            <a:off x="4179784" y="952218"/>
+            <a:ext cx="2715314" cy="1828800"/>
+          </a:xfrm>
+          <a:prstGeom prst="roundRect">
+            <a:avLst>
+              <a:gd name="adj" fmla="val 5556"/>
+            </a:avLst>
+          </a:prstGeom>
+          <a:ln>
+            <a:noFill/>
+          </a:ln>
+          <a:effectLst>
+            <a:outerShdw blurRad="50800" dist="38100" dir="2700000" algn="tl" rotWithShape="0">
+              <a:prstClr val="black">
+                <a:alpha val="40000"/>
+              </a:prstClr>
+            </a:outerShdw>
+          </a:effectLst>
+        </p:spPr>
+        <p:style>
+          <a:lnRef idx="2">
+            <a:schemeClr val="accent6"/>
+          </a:lnRef>
+          <a:fillRef idx="1">
+            <a:schemeClr val="lt1"/>
+          </a:fillRef>
+          <a:effectRef idx="0">
+            <a:schemeClr val="accent6"/>
+          </a:effectRef>
+          <a:fontRef idx="minor">
+            <a:schemeClr val="dk1"/>
+          </a:fontRef>
+        </p:style>
+        <p:txBody>
+          <a:bodyPr rtlCol="0" anchor="ctr"/>
+          <a:lstStyle/>
+          <a:p>
+            <a:pPr algn="ctr"/>
+            <a:endParaRPr lang="en-US"/>
+          </a:p>
+        </p:txBody>
+      </p:sp>
+      <p:sp>
+        <p:nvSpPr>
+          <p:cNvPr id="25" name="Rectangle: Rounded Corners 24">
+            <a:extLst>
+              <a:ext uri="{FF2B5EF4-FFF2-40B4-BE49-F238E27FC236}">
+                <a16:creationId xmlns:a16="http://schemas.microsoft.com/office/drawing/2014/main" id="{3E31E173-8D03-DA80-82B3-A9E7CE7B43A3}"/>
+              </a:ext>
+            </a:extLst>
+          </p:cNvPr>
+          <p:cNvSpPr/>
+          <p:nvPr/>
+        </p:nvSpPr>
+        <p:spPr>
+          <a:xfrm>
+            <a:off x="7109205" y="952218"/>
+            <a:ext cx="2715314" cy="1828800"/>
+          </a:xfrm>
+          <a:prstGeom prst="roundRect">
+            <a:avLst>
+              <a:gd name="adj" fmla="val 5556"/>
+            </a:avLst>
+          </a:prstGeom>
+          <a:ln>
+            <a:noFill/>
+          </a:ln>
+          <a:effectLst>
+            <a:outerShdw blurRad="50800" dist="38100" dir="2700000" algn="tl" rotWithShape="0">
+              <a:prstClr val="black">
+                <a:alpha val="40000"/>
+              </a:prstClr>
+            </a:outerShdw>
+          </a:effectLst>
+        </p:spPr>
+        <p:style>
+          <a:lnRef idx="2">
+            <a:schemeClr val="accent6"/>
+          </a:lnRef>
+          <a:fillRef idx="1">
+            <a:schemeClr val="lt1"/>
+          </a:fillRef>
+          <a:effectRef idx="0">
+            <a:schemeClr val="accent6"/>
+          </a:effectRef>
+          <a:fontRef idx="minor">
+            <a:schemeClr val="dk1"/>
+          </a:fontRef>
+        </p:style>
+        <p:txBody>
+          <a:bodyPr rtlCol="0" anchor="ctr"/>
+          <a:lstStyle/>
+          <a:p>
+            <a:pPr algn="ctr"/>
+            <a:endParaRPr lang="en-US"/>
+          </a:p>
+        </p:txBody>
+      </p:sp>
+      <p:sp>
+        <p:nvSpPr>
+          <p:cNvPr id="26" name="Rectangle: Rounded Corners 25">
+            <a:extLst>
+              <a:ext uri="{FF2B5EF4-FFF2-40B4-BE49-F238E27FC236}">
+                <a16:creationId xmlns:a16="http://schemas.microsoft.com/office/drawing/2014/main" id="{556BA970-A7D4-1000-0938-58574974C767}"/>
+              </a:ext>
+            </a:extLst>
+          </p:cNvPr>
+          <p:cNvSpPr/>
+          <p:nvPr/>
+        </p:nvSpPr>
+        <p:spPr>
+          <a:xfrm>
+            <a:off x="10038626" y="952218"/>
+            <a:ext cx="2715314" cy="1828800"/>
+          </a:xfrm>
+          <a:prstGeom prst="roundRect">
+            <a:avLst>
+              <a:gd name="adj" fmla="val 5556"/>
+            </a:avLst>
+          </a:prstGeom>
+          <a:ln>
+            <a:noFill/>
+          </a:ln>
+          <a:effectLst>
+            <a:outerShdw blurRad="50800" dist="38100" dir="2700000" algn="tl" rotWithShape="0">
+              <a:prstClr val="black">
+                <a:alpha val="40000"/>
+              </a:prstClr>
+            </a:outerShdw>
+          </a:effectLst>
+        </p:spPr>
+        <p:style>
+          <a:lnRef idx="2">
+            <a:schemeClr val="accent6"/>
+          </a:lnRef>
+          <a:fillRef idx="1">
+            <a:schemeClr val="lt1"/>
+          </a:fillRef>
+          <a:effectRef idx="0">
+            <a:schemeClr val="accent6"/>
+          </a:effectRef>
+          <a:fontRef idx="minor">
+            <a:schemeClr val="dk1"/>
+          </a:fontRef>
+        </p:style>
+        <p:txBody>
+          <a:bodyPr rtlCol="0" anchor="ctr"/>
+          <a:lstStyle/>
+          <a:p>
+            <a:pPr algn="ctr"/>
+            <a:endParaRPr lang="en-US"/>
+          </a:p>
+        </p:txBody>
+      </p:sp>
+      <p:pic>
+        <p:nvPicPr>
+          <p:cNvPr id="37" name="Picture 36" descr="A blue squares on a black background&#10;&#10;AI-generated content may be incorrect.">
+            <a:extLst>
+              <a:ext uri="{FF2B5EF4-FFF2-40B4-BE49-F238E27FC236}">
+                <a16:creationId xmlns:a16="http://schemas.microsoft.com/office/drawing/2014/main" id="{71D6FF12-9D60-AE76-16B9-A37BDC7C4051}"/>
+              </a:ext>
+            </a:extLst>
+          </p:cNvPr>
+          <p:cNvPicPr>
+            <a:picLocks noChangeAspect="1"/>
+          </p:cNvPicPr>
+          <p:nvPr/>
+        </p:nvPicPr>
+        <p:blipFill>
+          <a:blip r:embed="rId2">
+            <a:extLst>
+              <a:ext uri="{28A0092B-C50C-407E-A947-70E740481C1C}">
+                <a14:useLocalDpi xmlns:a14="http://schemas.microsoft.com/office/drawing/2010/main" val="0"/>
+              </a:ext>
+            </a:extLst>
+          </a:blip>
+          <a:stretch>
+            <a:fillRect/>
+          </a:stretch>
+        </p:blipFill>
+        <p:spPr>
+          <a:xfrm>
+            <a:off x="120181" y="41551"/>
+            <a:ext cx="861602" cy="861602"/>
+          </a:xfrm>
+          <a:prstGeom prst="rect">
+            <a:avLst/>
+          </a:prstGeom>
+        </p:spPr>
+      </p:pic>
+      <p:cxnSp>
+        <p:nvCxnSpPr>
+          <p:cNvPr id="39" name="Straight Connector 38">
+            <a:extLst>
+              <a:ext uri="{FF2B5EF4-FFF2-40B4-BE49-F238E27FC236}">
+                <a16:creationId xmlns:a16="http://schemas.microsoft.com/office/drawing/2014/main" id="{3B6559A8-F81A-6669-5C0D-0330FC8CCFB8}"/>
+              </a:ext>
+            </a:extLst>
+          </p:cNvPr>
+          <p:cNvCxnSpPr>
+            <a:cxnSpLocks/>
+          </p:cNvCxnSpPr>
+          <p:nvPr/>
+        </p:nvCxnSpPr>
+        <p:spPr>
+          <a:xfrm>
+            <a:off x="9824519" y="3082974"/>
+            <a:ext cx="0" cy="2573340"/>
+          </a:xfrm>
+          <a:prstGeom prst="line">
+            <a:avLst/>
+          </a:prstGeom>
+          <a:ln>
+            <a:solidFill>
+              <a:srgbClr val="4EA8DE">
+                <a:alpha val="65000"/>
+              </a:srgbClr>
+            </a:solidFill>
+          </a:ln>
+        </p:spPr>
+        <p:style>
+          <a:lnRef idx="2">
+            <a:schemeClr val="accent1"/>
+          </a:lnRef>
+          <a:fillRef idx="0">
+            <a:schemeClr val="accent1"/>
+          </a:fillRef>
+          <a:effectRef idx="1">
+            <a:schemeClr val="accent1"/>
+          </a:effectRef>
+          <a:fontRef idx="minor">
+            <a:schemeClr val="tx1"/>
+          </a:fontRef>
+        </p:style>
+      </p:cxnSp>
+      <p:cxnSp>
+        <p:nvCxnSpPr>
+          <p:cNvPr id="40" name="Straight Connector 39">
+            <a:extLst>
+              <a:ext uri="{FF2B5EF4-FFF2-40B4-BE49-F238E27FC236}">
+                <a16:creationId xmlns:a16="http://schemas.microsoft.com/office/drawing/2014/main" id="{67C5CC97-D70E-6296-29A3-1F1BB59932CC}"/>
+              </a:ext>
+            </a:extLst>
+          </p:cNvPr>
+          <p:cNvCxnSpPr>
+            <a:cxnSpLocks/>
+          </p:cNvCxnSpPr>
+          <p:nvPr/>
+        </p:nvCxnSpPr>
+        <p:spPr>
+          <a:xfrm>
+            <a:off x="9827259" y="6036632"/>
+            <a:ext cx="0" cy="2619273"/>
+          </a:xfrm>
+          <a:prstGeom prst="line">
+            <a:avLst/>
+          </a:prstGeom>
+          <a:ln>
+            <a:solidFill>
+              <a:srgbClr val="4EA8DE">
+                <a:alpha val="65000"/>
+              </a:srgbClr>
+            </a:solidFill>
+          </a:ln>
+        </p:spPr>
+        <p:style>
+          <a:lnRef idx="2">
+            <a:schemeClr val="accent1"/>
+          </a:lnRef>
+          <a:fillRef idx="0">
+            <a:schemeClr val="accent1"/>
+          </a:fillRef>
+          <a:effectRef idx="1">
+            <a:schemeClr val="accent1"/>
+          </a:effectRef>
+          <a:fontRef idx="minor">
+            <a:schemeClr val="tx1"/>
+          </a:fontRef>
+        </p:style>
+      </p:cxnSp>
+      <p:sp>
+        <p:nvSpPr>
+          <p:cNvPr id="2" name="Rectangle: Rounded Corners 1">
+            <a:extLst>
+              <a:ext uri="{FF2B5EF4-FFF2-40B4-BE49-F238E27FC236}">
+                <a16:creationId xmlns:a16="http://schemas.microsoft.com/office/drawing/2014/main" id="{E8611670-07BF-3219-4CB7-F688E12980DE}"/>
+              </a:ext>
+            </a:extLst>
+          </p:cNvPr>
+          <p:cNvSpPr/>
+          <p:nvPr/>
+        </p:nvSpPr>
+        <p:spPr>
+          <a:xfrm>
+            <a:off x="353605" y="2785968"/>
+            <a:ext cx="14447520" cy="142875"/>
           </a:xfrm>
           <a:prstGeom prst="roundRect">
             <a:avLst>
@@ -6141,10 +7310,10 @@
       </p:sp>
       <p:sp>
         <p:nvSpPr>
-          <p:cNvPr id="5" name="Rectangle: Rounded Corners 4">
-            <a:extLst>
-              <a:ext uri="{FF2B5EF4-FFF2-40B4-BE49-F238E27FC236}">
-                <a16:creationId xmlns:a16="http://schemas.microsoft.com/office/drawing/2014/main" id="{EA05A776-1F05-816A-C908-52CCD6E3733B}"/>
+          <p:cNvPr id="3" name="Rectangle: Rounded Corners 2">
+            <a:extLst>
+              <a:ext uri="{FF2B5EF4-FFF2-40B4-BE49-F238E27FC236}">
+                <a16:creationId xmlns:a16="http://schemas.microsoft.com/office/drawing/2014/main" id="{DB74852A-177D-3F21-D0F0-DA89270B742E}"/>
               </a:ext>
             </a:extLst>
           </p:cNvPr>
@@ -6152,9 +7321,9 @@
           <p:nvPr/>
         </p:nvSpPr>
         <p:spPr>
-          <a:xfrm rot="16200000">
-            <a:off x="12482147" y="4092564"/>
-            <a:ext cx="6521697" cy="142875"/>
+          <a:xfrm>
+            <a:off x="0" y="5738358"/>
+            <a:ext cx="14447520" cy="142875"/>
           </a:xfrm>
           <a:prstGeom prst="roundRect">
             <a:avLst>
@@ -6189,10 +7358,10 @@
       </p:sp>
       <p:sp>
         <p:nvSpPr>
-          <p:cNvPr id="6" name="Rectangle: Rounded Corners 5">
-            <a:extLst>
-              <a:ext uri="{FF2B5EF4-FFF2-40B4-BE49-F238E27FC236}">
-                <a16:creationId xmlns:a16="http://schemas.microsoft.com/office/drawing/2014/main" id="{B84C7624-875B-699E-8009-06546F076E04}"/>
+          <p:cNvPr id="4" name="Rectangle: Rounded Corners 3">
+            <a:extLst>
+              <a:ext uri="{FF2B5EF4-FFF2-40B4-BE49-F238E27FC236}">
+                <a16:creationId xmlns:a16="http://schemas.microsoft.com/office/drawing/2014/main" id="{488C0AE7-5EC3-2B31-D698-25027C4A3648}"/>
               </a:ext>
             </a:extLst>
           </p:cNvPr>
@@ -6200,9 +7369,9 @@
           <p:nvPr/>
         </p:nvSpPr>
         <p:spPr>
-          <a:xfrm>
-            <a:off x="798984" y="8772525"/>
-            <a:ext cx="14904720" cy="142875"/>
+          <a:xfrm rot="16200000">
+            <a:off x="-2113844" y="3661763"/>
+            <a:ext cx="6521697" cy="142875"/>
           </a:xfrm>
           <a:prstGeom prst="roundRect">
             <a:avLst>
@@ -6235,10 +7404,283 @@
           </a:p>
         </p:txBody>
       </p:sp>
+      <p:sp>
+        <p:nvSpPr>
+          <p:cNvPr id="5" name="Rectangle: Rounded Corners 4">
+            <a:extLst>
+              <a:ext uri="{FF2B5EF4-FFF2-40B4-BE49-F238E27FC236}">
+                <a16:creationId xmlns:a16="http://schemas.microsoft.com/office/drawing/2014/main" id="{82B79525-B355-788A-6A21-7F907EC1BA16}"/>
+              </a:ext>
+            </a:extLst>
+          </p:cNvPr>
+          <p:cNvSpPr/>
+          <p:nvPr/>
+        </p:nvSpPr>
+        <p:spPr>
+          <a:xfrm rot="16200000">
+            <a:off x="12482147" y="4092564"/>
+            <a:ext cx="6521697" cy="142875"/>
+          </a:xfrm>
+          <a:prstGeom prst="roundRect">
+            <a:avLst>
+              <a:gd name="adj" fmla="val 0"/>
+            </a:avLst>
+          </a:prstGeom>
+        </p:spPr>
+        <p:style>
+          <a:lnRef idx="2">
+            <a:schemeClr val="accent1">
+              <a:shade val="15000"/>
+            </a:schemeClr>
+          </a:lnRef>
+          <a:fillRef idx="1">
+            <a:schemeClr val="accent1"/>
+          </a:fillRef>
+          <a:effectRef idx="0">
+            <a:schemeClr val="accent1"/>
+          </a:effectRef>
+          <a:fontRef idx="minor">
+            <a:schemeClr val="lt1"/>
+          </a:fontRef>
+        </p:style>
+        <p:txBody>
+          <a:bodyPr rtlCol="0" anchor="ctr"/>
+          <a:lstStyle/>
+          <a:p>
+            <a:pPr algn="ctr"/>
+            <a:endParaRPr lang="en-US"/>
+          </a:p>
+        </p:txBody>
+      </p:sp>
+      <p:sp>
+        <p:nvSpPr>
+          <p:cNvPr id="6" name="Rectangle: Rounded Corners 5">
+            <a:extLst>
+              <a:ext uri="{FF2B5EF4-FFF2-40B4-BE49-F238E27FC236}">
+                <a16:creationId xmlns:a16="http://schemas.microsoft.com/office/drawing/2014/main" id="{6EAC7215-6CEF-BDB5-773E-45C8D50242E9}"/>
+              </a:ext>
+            </a:extLst>
+          </p:cNvPr>
+          <p:cNvSpPr/>
+          <p:nvPr/>
+        </p:nvSpPr>
+        <p:spPr>
+          <a:xfrm>
+            <a:off x="798984" y="8772525"/>
+            <a:ext cx="14904720" cy="142875"/>
+          </a:xfrm>
+          <a:prstGeom prst="roundRect">
+            <a:avLst>
+              <a:gd name="adj" fmla="val 0"/>
+            </a:avLst>
+          </a:prstGeom>
+        </p:spPr>
+        <p:style>
+          <a:lnRef idx="2">
+            <a:schemeClr val="accent1">
+              <a:shade val="15000"/>
+            </a:schemeClr>
+          </a:lnRef>
+          <a:fillRef idx="1">
+            <a:schemeClr val="accent1"/>
+          </a:fillRef>
+          <a:effectRef idx="0">
+            <a:schemeClr val="accent1"/>
+          </a:effectRef>
+          <a:fontRef idx="minor">
+            <a:schemeClr val="lt1"/>
+          </a:fontRef>
+        </p:style>
+        <p:txBody>
+          <a:bodyPr rtlCol="0" anchor="ctr"/>
+          <a:lstStyle/>
+          <a:p>
+            <a:pPr algn="ctr"/>
+            <a:endParaRPr lang="en-US"/>
+          </a:p>
+        </p:txBody>
+      </p:sp>
+      <p:grpSp>
+        <p:nvGrpSpPr>
+          <p:cNvPr id="15" name="Group 14">
+            <a:extLst>
+              <a:ext uri="{FF2B5EF4-FFF2-40B4-BE49-F238E27FC236}">
+                <a16:creationId xmlns:a16="http://schemas.microsoft.com/office/drawing/2014/main" id="{02E00C77-DFB0-2C8D-F9CC-D69CDEBFD0F4}"/>
+              </a:ext>
+            </a:extLst>
+          </p:cNvPr>
+          <p:cNvGrpSpPr/>
+          <p:nvPr/>
+        </p:nvGrpSpPr>
+        <p:grpSpPr>
+          <a:xfrm>
+            <a:off x="7921806" y="5866205"/>
+            <a:ext cx="274320" cy="719843"/>
+            <a:chOff x="7339263" y="6027821"/>
+            <a:chExt cx="274320" cy="719843"/>
+          </a:xfrm>
+        </p:grpSpPr>
+        <p:sp>
+          <p:nvSpPr>
+            <p:cNvPr id="7" name="Oval 6">
+              <a:extLst>
+                <a:ext uri="{FF2B5EF4-FFF2-40B4-BE49-F238E27FC236}">
+                  <a16:creationId xmlns:a16="http://schemas.microsoft.com/office/drawing/2014/main" id="{33A09229-2531-D0D6-C47C-3778CD3ACE31}"/>
+                </a:ext>
+              </a:extLst>
+            </p:cNvPr>
+            <p:cNvSpPr/>
+            <p:nvPr/>
+          </p:nvSpPr>
+          <p:spPr>
+            <a:xfrm>
+              <a:off x="7339263" y="6027821"/>
+              <a:ext cx="274320" cy="274320"/>
+            </a:xfrm>
+            <a:prstGeom prst="ellipse">
+              <a:avLst/>
+            </a:prstGeom>
+            <a:solidFill>
+              <a:srgbClr val="4EA8DE"/>
+            </a:solidFill>
+            <a:ln>
+              <a:noFill/>
+            </a:ln>
+          </p:spPr>
+          <p:style>
+            <a:lnRef idx="2">
+              <a:schemeClr val="accent1">
+                <a:shade val="15000"/>
+              </a:schemeClr>
+            </a:lnRef>
+            <a:fillRef idx="1">
+              <a:schemeClr val="accent1"/>
+            </a:fillRef>
+            <a:effectRef idx="0">
+              <a:schemeClr val="accent1"/>
+            </a:effectRef>
+            <a:fontRef idx="minor">
+              <a:schemeClr val="lt1"/>
+            </a:fontRef>
+          </p:style>
+          <p:txBody>
+            <a:bodyPr rtlCol="0" anchor="ctr"/>
+            <a:lstStyle/>
+            <a:p>
+              <a:pPr algn="ctr"/>
+              <a:endParaRPr lang="en-US"/>
+            </a:p>
+          </p:txBody>
+        </p:sp>
+        <p:sp>
+          <p:nvSpPr>
+            <p:cNvPr id="8" name="Oval 7">
+              <a:extLst>
+                <a:ext uri="{FF2B5EF4-FFF2-40B4-BE49-F238E27FC236}">
+                  <a16:creationId xmlns:a16="http://schemas.microsoft.com/office/drawing/2014/main" id="{A76B6ADA-D2FE-6947-1A08-2D4CAFF7F7A2}"/>
+                </a:ext>
+              </a:extLst>
+            </p:cNvPr>
+            <p:cNvSpPr/>
+            <p:nvPr/>
+          </p:nvSpPr>
+          <p:spPr>
+            <a:xfrm>
+              <a:off x="7384983" y="6364882"/>
+              <a:ext cx="182880" cy="182880"/>
+            </a:xfrm>
+            <a:prstGeom prst="ellipse">
+              <a:avLst/>
+            </a:prstGeom>
+            <a:solidFill>
+              <a:srgbClr val="4EA8DE"/>
+            </a:solidFill>
+            <a:ln>
+              <a:noFill/>
+            </a:ln>
+          </p:spPr>
+          <p:style>
+            <a:lnRef idx="2">
+              <a:schemeClr val="accent1">
+                <a:shade val="15000"/>
+              </a:schemeClr>
+            </a:lnRef>
+            <a:fillRef idx="1">
+              <a:schemeClr val="accent1"/>
+            </a:fillRef>
+            <a:effectRef idx="0">
+              <a:schemeClr val="accent1"/>
+            </a:effectRef>
+            <a:fontRef idx="minor">
+              <a:schemeClr val="lt1"/>
+            </a:fontRef>
+          </p:style>
+          <p:txBody>
+            <a:bodyPr rtlCol="0" anchor="ctr"/>
+            <a:lstStyle/>
+            <a:p>
+              <a:pPr algn="ctr"/>
+              <a:endParaRPr lang="en-US"/>
+            </a:p>
+          </p:txBody>
+        </p:sp>
+        <p:sp>
+          <p:nvSpPr>
+            <p:cNvPr id="13" name="Oval 12">
+              <a:extLst>
+                <a:ext uri="{FF2B5EF4-FFF2-40B4-BE49-F238E27FC236}">
+                  <a16:creationId xmlns:a16="http://schemas.microsoft.com/office/drawing/2014/main" id="{3E2F182B-361A-5609-83D7-DCC86EA31288}"/>
+                </a:ext>
+              </a:extLst>
+            </p:cNvPr>
+            <p:cNvSpPr/>
+            <p:nvPr/>
+          </p:nvSpPr>
+          <p:spPr>
+            <a:xfrm>
+              <a:off x="7407843" y="6610504"/>
+              <a:ext cx="137160" cy="137160"/>
+            </a:xfrm>
+            <a:prstGeom prst="ellipse">
+              <a:avLst/>
+            </a:prstGeom>
+            <a:solidFill>
+              <a:srgbClr val="4EA8DE"/>
+            </a:solidFill>
+            <a:ln>
+              <a:noFill/>
+            </a:ln>
+          </p:spPr>
+          <p:style>
+            <a:lnRef idx="2">
+              <a:schemeClr val="accent1">
+                <a:shade val="15000"/>
+              </a:schemeClr>
+            </a:lnRef>
+            <a:fillRef idx="1">
+              <a:schemeClr val="accent1"/>
+            </a:fillRef>
+            <a:effectRef idx="0">
+              <a:schemeClr val="accent1"/>
+            </a:effectRef>
+            <a:fontRef idx="minor">
+              <a:schemeClr val="lt1"/>
+            </a:fontRef>
+          </p:style>
+          <p:txBody>
+            <a:bodyPr rtlCol="0" anchor="ctr"/>
+            <a:lstStyle/>
+            <a:p>
+              <a:pPr algn="ctr"/>
+              <a:endParaRPr lang="en-US"/>
+            </a:p>
+          </p:txBody>
+        </p:sp>
+      </p:grpSp>
     </p:spTree>
     <p:extLst>
       <p:ext uri="{BB962C8B-B14F-4D97-AF65-F5344CB8AC3E}">
-        <p14:creationId xmlns:p14="http://schemas.microsoft.com/office/powerpoint/2010/main" val="3728154160"/>
+        <p14:creationId xmlns:p14="http://schemas.microsoft.com/office/powerpoint/2010/main" val="3206068206"/>
       </p:ext>
     </p:extLst>
   </p:cSld>

</xml_diff>